<commit_message>
Updates to Ch 12
</commit_message>
<xml_diff>
--- a/Lecture Slides/VideoLectureSlides/12.8 vector.pptx
+++ b/Lecture Slides/VideoLectureSlides/12.8 vector.pptx
@@ -5,7 +5,7 @@
     <p:sldMasterId id="2147483660" r:id="rId4"/>
   </p:sldMasterIdLst>
   <p:notesMasterIdLst>
-    <p:notesMasterId r:id="rId21"/>
+    <p:notesMasterId r:id="rId22"/>
   </p:notesMasterIdLst>
   <p:sldIdLst>
     <p:sldId id="256" r:id="rId5"/>
@@ -18,12 +18,13 @@
     <p:sldId id="257" r:id="rId12"/>
     <p:sldId id="261" r:id="rId13"/>
     <p:sldId id="265" r:id="rId14"/>
-    <p:sldId id="287" r:id="rId15"/>
-    <p:sldId id="288" r:id="rId16"/>
-    <p:sldId id="300" r:id="rId17"/>
-    <p:sldId id="266" r:id="rId18"/>
-    <p:sldId id="268" r:id="rId19"/>
-    <p:sldId id="270" r:id="rId20"/>
+    <p:sldId id="307" r:id="rId15"/>
+    <p:sldId id="287" r:id="rId16"/>
+    <p:sldId id="288" r:id="rId17"/>
+    <p:sldId id="300" r:id="rId18"/>
+    <p:sldId id="266" r:id="rId19"/>
+    <p:sldId id="268" r:id="rId20"/>
+    <p:sldId id="270" r:id="rId21"/>
   </p:sldIdLst>
   <p:sldSz cx="9144000" cy="6858000" type="screen4x3"/>
   <p:notesSz cx="6858000" cy="9144000"/>
@@ -237,7 +238,7 @@
           <a:p>
             <a:fld id="{1AA1AB63-216F-4D5B-8811-CCB935E98D4A}" type="datetimeFigureOut">
               <a:rPr lang="en-US" smtClean="0"/>
-              <a:t>9/20/21</a:t>
+              <a:t>9/23/21</a:t>
             </a:fld>
             <a:endParaRPr lang="en-US" dirty="0"/>
           </a:p>
@@ -643,6 +644,90 @@
             <a:spLocks noGrp="1"/>
           </p:cNvSpPr>
           <p:nvPr>
+            <p:ph type="sldNum" sz="quarter" idx="10"/>
+          </p:nvPr>
+        </p:nvSpPr>
+        <p:spPr/>
+        <p:txBody>
+          <a:bodyPr/>
+          <a:lstStyle/>
+          <a:p>
+            <a:fld id="{198B1ED1-A6A8-44D7-9A75-7C99E7381227}" type="slidenum">
+              <a:rPr lang="en-US" smtClean="0"/>
+              <a:t>11</a:t>
+            </a:fld>
+            <a:endParaRPr lang="en-US"/>
+          </a:p>
+        </p:txBody>
+      </p:sp>
+    </p:spTree>
+    <p:extLst>
+      <p:ext uri="{BB962C8B-B14F-4D97-AF65-F5344CB8AC3E}">
+        <p14:creationId xmlns:p14="http://schemas.microsoft.com/office/powerpoint/2010/main" val="431541448"/>
+      </p:ext>
+    </p:extLst>
+  </p:cSld>
+  <p:clrMapOvr>
+    <a:masterClrMapping/>
+  </p:clrMapOvr>
+</p:notes>
+</file>
+
+<file path=ppt/notesSlides/notesSlide3.xml><?xml version="1.0" encoding="utf-8"?>
+<p:notes xmlns:a="http://schemas.openxmlformats.org/drawingml/2006/main" xmlns:r="http://schemas.openxmlformats.org/officeDocument/2006/relationships" xmlns:p="http://schemas.openxmlformats.org/presentationml/2006/main">
+  <p:cSld>
+    <p:spTree>
+      <p:nvGrpSpPr>
+        <p:cNvPr id="1" name=""/>
+        <p:cNvGrpSpPr/>
+        <p:nvPr/>
+      </p:nvGrpSpPr>
+      <p:grpSpPr>
+        <a:xfrm>
+          <a:off x="0" y="0"/>
+          <a:ext cx="0" cy="0"/>
+          <a:chOff x="0" y="0"/>
+          <a:chExt cx="0" cy="0"/>
+        </a:xfrm>
+      </p:grpSpPr>
+      <p:sp>
+        <p:nvSpPr>
+          <p:cNvPr id="2" name="Slide Image Placeholder 1"/>
+          <p:cNvSpPr>
+            <a:spLocks noGrp="1" noRot="1" noChangeAspect="1"/>
+          </p:cNvSpPr>
+          <p:nvPr>
+            <p:ph type="sldImg"/>
+          </p:nvPr>
+        </p:nvSpPr>
+        <p:spPr/>
+      </p:sp>
+      <p:sp>
+        <p:nvSpPr>
+          <p:cNvPr id="3" name="Notes Placeholder 2"/>
+          <p:cNvSpPr>
+            <a:spLocks noGrp="1"/>
+          </p:cNvSpPr>
+          <p:nvPr>
+            <p:ph type="body" idx="1"/>
+          </p:nvPr>
+        </p:nvSpPr>
+        <p:spPr/>
+        <p:txBody>
+          <a:bodyPr/>
+          <a:lstStyle/>
+          <a:p>
+            <a:endParaRPr lang="en-US" dirty="0"/>
+          </a:p>
+        </p:txBody>
+      </p:sp>
+      <p:sp>
+        <p:nvSpPr>
+          <p:cNvPr id="4" name="Slide Number Placeholder 3"/>
+          <p:cNvSpPr>
+            <a:spLocks noGrp="1"/>
+          </p:cNvSpPr>
+          <p:nvPr>
             <p:ph type="sldNum" sz="quarter" idx="5"/>
           </p:nvPr>
         </p:nvSpPr>
@@ -653,7 +738,7 @@
           <a:p>
             <a:fld id="{198B1ED1-A6A8-44D7-9A75-7C99E7381227}" type="slidenum">
               <a:rPr lang="en-US" smtClean="0"/>
-              <a:t>16</a:t>
+              <a:t>17</a:t>
             </a:fld>
             <a:endParaRPr lang="en-US"/>
           </a:p>
@@ -3958,11 +4043,7 @@
           <a:lstStyle/>
           <a:p>
             <a:r>
-              <a:rPr lang="en-US" dirty="0">
-                <a:highlight>
-                  <a:srgbClr val="FFFF00"/>
-                </a:highlight>
-              </a:rPr>
+              <a:rPr lang="en-US" dirty="0"/>
               <a:t>Rotating Frames Analysis Process</a:t>
             </a:r>
           </a:p>
@@ -3992,7 +4073,7 @@
         </p:spPr>
         <p:txBody>
           <a:bodyPr>
-            <a:normAutofit fontScale="77500" lnSpcReduction="20000"/>
+            <a:normAutofit fontScale="70000" lnSpcReduction="20000"/>
           </a:bodyPr>
           <a:lstStyle/>
           <a:p>
@@ -4012,6 +4093,29 @@
             <a:pPr lvl="1"/>
             <a:r>
               <a:rPr lang="en-US" dirty="0"/>
+              <a:t>Add a rotating coordinate system (on the body that views the non-pinned body) and identify the angular </a:t>
+            </a:r>
+            <a:r>
+              <a:rPr lang="en-US" i="1" dirty="0"/>
+              <a:t>v</a:t>
+            </a:r>
+            <a:r>
+              <a:rPr lang="en-US" dirty="0"/>
+              <a:t> and </a:t>
+            </a:r>
+            <a:r>
+              <a:rPr lang="en-US" i="1" dirty="0"/>
+              <a:t>a</a:t>
+            </a:r>
+            <a:r>
+              <a:rPr lang="en-US" dirty="0"/>
+              <a:t> of the frame</a:t>
+            </a:r>
+          </a:p>
+          <a:p>
+            <a:pPr lvl="1"/>
+            <a:r>
+              <a:rPr lang="en-US" dirty="0"/>
               <a:t>Identify any known angular and linear velocities and accelerations (magnitude and/or direction)</a:t>
             </a:r>
           </a:p>
@@ -4032,7 +4136,7 @@
             <a:pPr lvl="1"/>
             <a:r>
               <a:rPr lang="en-US" dirty="0"/>
-              <a:t>Use a series of relative motion equations as needed, substituting into one equation</a:t>
+              <a:t>Use a series of relative motion equations OR rotating frame equations as needed, substituting into one vector equation</a:t>
             </a:r>
           </a:p>
           <a:p>
@@ -4111,26 +4215,39 @@
                                   </p:childTnLst>
                                 </p:cTn>
                               </p:par>
-                            </p:childTnLst>
-                          </p:cTn>
-                        </p:par>
-                      </p:childTnLst>
-                    </p:cTn>
-                  </p:par>
-                  <p:par>
-                    <p:cTn id="7" fill="hold">
-                      <p:stCondLst>
-                        <p:cond delay="indefinite"/>
-                      </p:stCondLst>
-                      <p:childTnLst>
-                        <p:par>
-                          <p:cTn id="8" fill="hold">
-                            <p:stCondLst>
-                              <p:cond delay="0"/>
-                            </p:stCondLst>
-                            <p:childTnLst>
                               <p:par>
-                                <p:cTn id="9" presetID="1" presetClass="entr" presetSubtype="0" fill="hold" grpId="0" nodeType="clickEffect">
+                                <p:cTn id="7" presetID="1" presetClass="entr" presetSubtype="0" fill="hold" grpId="0" nodeType="withEffect">
+                                  <p:stCondLst>
+                                    <p:cond delay="0"/>
+                                  </p:stCondLst>
+                                  <p:childTnLst>
+                                    <p:set>
+                                      <p:cBhvr>
+                                        <p:cTn id="8" dur="1" fill="hold">
+                                          <p:stCondLst>
+                                            <p:cond delay="0"/>
+                                          </p:stCondLst>
+                                        </p:cTn>
+                                        <p:tgtEl>
+                                          <p:spTgt spid="3">
+                                            <p:txEl>
+                                              <p:pRg st="1" end="1"/>
+                                            </p:txEl>
+                                          </p:spTgt>
+                                        </p:tgtEl>
+                                        <p:attrNameLst>
+                                          <p:attrName>style.visibility</p:attrName>
+                                        </p:attrNameLst>
+                                      </p:cBhvr>
+                                      <p:to>
+                                        <p:strVal val="visible"/>
+                                      </p:to>
+                                    </p:set>
+                                  </p:childTnLst>
+                                </p:cTn>
+                              </p:par>
+                              <p:par>
+                                <p:cTn id="9" presetID="1" presetClass="entr" presetSubtype="0" fill="hold" grpId="0" nodeType="withEffect">
                                   <p:stCondLst>
                                     <p:cond delay="0"/>
                                   </p:stCondLst>
@@ -4145,7 +4262,7 @@
                                         <p:tgtEl>
                                           <p:spTgt spid="3">
                                             <p:txEl>
-                                              <p:pRg st="1" end="1"/>
+                                              <p:pRg st="2" end="2"/>
                                             </p:txEl>
                                           </p:spTgt>
                                         </p:tgtEl>
@@ -4176,7 +4293,7 @@
                                         <p:tgtEl>
                                           <p:spTgt spid="3">
                                             <p:txEl>
-                                              <p:pRg st="2" end="2"/>
+                                              <p:pRg st="3" end="3"/>
                                             </p:txEl>
                                           </p:spTgt>
                                         </p:tgtEl>
@@ -4207,7 +4324,7 @@
                                         <p:tgtEl>
                                           <p:spTgt spid="3">
                                             <p:txEl>
-                                              <p:pRg st="3" end="3"/>
+                                              <p:pRg st="4" end="4"/>
                                             </p:txEl>
                                           </p:spTgt>
                                         </p:tgtEl>
@@ -4256,7 +4373,7 @@
                                         <p:tgtEl>
                                           <p:spTgt spid="3">
                                             <p:txEl>
-                                              <p:pRg st="4" end="4"/>
+                                              <p:pRg st="5" end="5"/>
                                             </p:txEl>
                                           </p:spTgt>
                                         </p:tgtEl>
@@ -4287,7 +4404,7 @@
                                         <p:tgtEl>
                                           <p:spTgt spid="3">
                                             <p:txEl>
-                                              <p:pRg st="5" end="5"/>
+                                              <p:pRg st="6" end="6"/>
                                             </p:txEl>
                                           </p:spTgt>
                                         </p:tgtEl>
@@ -4336,7 +4453,7 @@
                                         <p:tgtEl>
                                           <p:spTgt spid="3">
                                             <p:txEl>
-                                              <p:pRg st="6" end="6"/>
+                                              <p:pRg st="7" end="7"/>
                                             </p:txEl>
                                           </p:spTgt>
                                         </p:tgtEl>
@@ -4367,7 +4484,7 @@
                                         <p:tgtEl>
                                           <p:spTgt spid="3">
                                             <p:txEl>
-                                              <p:pRg st="7" end="7"/>
+                                              <p:pRg st="8" end="8"/>
                                             </p:txEl>
                                           </p:spTgt>
                                         </p:tgtEl>
@@ -4410,13 +4527,154 @@
       </p:par>
     </p:tnLst>
     <p:bldLst>
-      <p:bldP spid="3" grpId="0" build="p"/>
+      <p:bldP spid="3" grpId="0" uiExpand="1" build="p"/>
     </p:bldLst>
   </p:timing>
 </p:sld>
 </file>
 
 <file path=ppt/slides/slide11.xml><?xml version="1.0" encoding="utf-8"?>
+<p:sld xmlns:a="http://schemas.openxmlformats.org/drawingml/2006/main" xmlns:r="http://schemas.openxmlformats.org/officeDocument/2006/relationships" xmlns:p="http://schemas.openxmlformats.org/presentationml/2006/main">
+  <p:cSld>
+    <p:spTree>
+      <p:nvGrpSpPr>
+        <p:cNvPr id="1" name=""/>
+        <p:cNvGrpSpPr/>
+        <p:nvPr/>
+      </p:nvGrpSpPr>
+      <p:grpSpPr>
+        <a:xfrm>
+          <a:off x="0" y="0"/>
+          <a:ext cx="0" cy="0"/>
+          <a:chOff x="0" y="0"/>
+          <a:chExt cx="0" cy="0"/>
+        </a:xfrm>
+      </p:grpSpPr>
+      <p:sp>
+        <p:nvSpPr>
+          <p:cNvPr id="2" name="Title 1"/>
+          <p:cNvSpPr>
+            <a:spLocks noGrp="1"/>
+          </p:cNvSpPr>
+          <p:nvPr>
+            <p:ph type="title"/>
+          </p:nvPr>
+        </p:nvSpPr>
+        <p:spPr/>
+        <p:txBody>
+          <a:bodyPr>
+            <a:normAutofit/>
+          </a:bodyPr>
+          <a:lstStyle/>
+          <a:p>
+            <a:r>
+              <a:rPr lang="en-US" dirty="0"/>
+              <a:t>Hints for Rotating Frames</a:t>
+            </a:r>
+          </a:p>
+        </p:txBody>
+      </p:sp>
+      <p:sp>
+        <p:nvSpPr>
+          <p:cNvPr id="3" name="Content Placeholder 2"/>
+          <p:cNvSpPr>
+            <a:spLocks noGrp="1"/>
+          </p:cNvSpPr>
+          <p:nvPr>
+            <p:ph idx="1"/>
+          </p:nvPr>
+        </p:nvSpPr>
+        <p:spPr/>
+        <p:txBody>
+          <a:bodyPr>
+            <a:normAutofit lnSpcReduction="10000"/>
+          </a:bodyPr>
+          <a:lstStyle/>
+          <a:p>
+            <a:r>
+              <a:rPr lang="en-US" dirty="0"/>
+              <a:t>Think about placement/orientation of your rotating frame to reduce the algebra work in your solution</a:t>
+            </a:r>
+          </a:p>
+          <a:p>
+            <a:r>
+              <a:rPr lang="en-CA" dirty="0"/>
+              <a:t>Write out the whole equation, and make sure you don’t miss any terms</a:t>
+            </a:r>
+            <a:endParaRPr lang="en-US" dirty="0"/>
+          </a:p>
+          <a:p>
+            <a:r>
+              <a:rPr lang="en-US" dirty="0"/>
+              <a:t>Be clear in each equation which frame (</a:t>
+            </a:r>
+            <a:r>
+              <a:rPr lang="en-US" dirty="0" err="1"/>
+              <a:t>xyz</a:t>
+            </a:r>
+            <a:r>
+              <a:rPr lang="en-US" dirty="0"/>
+              <a:t> or </a:t>
+            </a:r>
+            <a:r>
+              <a:rPr lang="en-US" dirty="0" err="1"/>
+              <a:t>x’y’z</a:t>
+            </a:r>
+            <a:r>
+              <a:rPr lang="en-US" dirty="0"/>
+              <a:t>’) is being used</a:t>
+            </a:r>
+          </a:p>
+          <a:p>
+            <a:r>
+              <a:rPr lang="en-US" dirty="0"/>
+              <a:t>Take your time with this analysis – it can </a:t>
+            </a:r>
+            <a:r>
+              <a:rPr lang="en-US"/>
+              <a:t>be challenging</a:t>
+            </a:r>
+            <a:endParaRPr lang="en-US" dirty="0"/>
+          </a:p>
+        </p:txBody>
+      </p:sp>
+      <p:sp>
+        <p:nvSpPr>
+          <p:cNvPr id="4" name="Slide Number Placeholder 3"/>
+          <p:cNvSpPr>
+            <a:spLocks noGrp="1"/>
+          </p:cNvSpPr>
+          <p:nvPr>
+            <p:ph type="sldNum" sz="quarter" idx="12"/>
+          </p:nvPr>
+        </p:nvSpPr>
+        <p:spPr/>
+        <p:txBody>
+          <a:bodyPr/>
+          <a:lstStyle/>
+          <a:p>
+            <a:fld id="{929262FE-7F58-4A1E-8AF3-5A510A86DEBD}" type="slidenum">
+              <a:rPr lang="en-US" smtClean="0"/>
+              <a:t>11</a:t>
+            </a:fld>
+            <a:endParaRPr lang="en-US"/>
+          </a:p>
+        </p:txBody>
+      </p:sp>
+    </p:spTree>
+    <p:extLst>
+      <p:ext uri="{BB962C8B-B14F-4D97-AF65-F5344CB8AC3E}">
+        <p14:creationId xmlns:p14="http://schemas.microsoft.com/office/powerpoint/2010/main" val="3961409743"/>
+      </p:ext>
+    </p:extLst>
+  </p:cSld>
+  <p:clrMapOvr>
+    <a:masterClrMapping/>
+  </p:clrMapOvr>
+</p:sld>
+</file>
+
+<file path=ppt/slides/slide12.xml><?xml version="1.0" encoding="utf-8"?>
 <p:sld xmlns:a="http://schemas.openxmlformats.org/drawingml/2006/main" xmlns:r="http://schemas.openxmlformats.org/officeDocument/2006/relationships" xmlns:p="http://schemas.openxmlformats.org/presentationml/2006/main">
   <p:cSld>
     <p:spTree>
@@ -4490,7 +4748,7 @@
 </p:sld>
 </file>
 
-<file path=ppt/slides/slide12.xml><?xml version="1.0" encoding="utf-8"?>
+<file path=ppt/slides/slide13.xml><?xml version="1.0" encoding="utf-8"?>
 <p:sld xmlns:a="http://schemas.openxmlformats.org/drawingml/2006/main" xmlns:r="http://schemas.openxmlformats.org/officeDocument/2006/relationships" xmlns:p="http://schemas.openxmlformats.org/presentationml/2006/main">
   <p:cSld>
     <p:spTree>
@@ -5845,7 +6103,7 @@
 </p:sld>
 </file>
 
-<file path=ppt/slides/slide13.xml><?xml version="1.0" encoding="utf-8"?>
+<file path=ppt/slides/slide14.xml><?xml version="1.0" encoding="utf-8"?>
 <p:sld xmlns:a="http://schemas.openxmlformats.org/drawingml/2006/main" xmlns:r="http://schemas.openxmlformats.org/officeDocument/2006/relationships" xmlns:p="http://schemas.openxmlformats.org/presentationml/2006/main">
   <p:cSld>
     <p:spTree>
@@ -7130,7 +7388,7 @@
 </p:sld>
 </file>
 
-<file path=ppt/slides/slide14.xml><?xml version="1.0" encoding="utf-8"?>
+<file path=ppt/slides/slide15.xml><?xml version="1.0" encoding="utf-8"?>
 <p:sld xmlns:a="http://schemas.openxmlformats.org/drawingml/2006/main" xmlns:r="http://schemas.openxmlformats.org/officeDocument/2006/relationships" xmlns:p="http://schemas.openxmlformats.org/presentationml/2006/main">
   <p:cSld>
     <p:spTree>
@@ -8685,7 +8943,7 @@
 </p:sld>
 </file>
 
-<file path=ppt/slides/slide15.xml><?xml version="1.0" encoding="utf-8"?>
+<file path=ppt/slides/slide16.xml><?xml version="1.0" encoding="utf-8"?>
 <p:sld xmlns:a="http://schemas.openxmlformats.org/drawingml/2006/main" xmlns:r="http://schemas.openxmlformats.org/officeDocument/2006/relationships" xmlns:p="http://schemas.openxmlformats.org/presentationml/2006/main">
   <p:cSld>
     <p:spTree>
@@ -8825,7 +9083,7 @@
 </p:sld>
 </file>
 
-<file path=ppt/slides/slide16.xml><?xml version="1.0" encoding="utf-8"?>
+<file path=ppt/slides/slide17.xml><?xml version="1.0" encoding="utf-8"?>
 <p:sld xmlns:a="http://schemas.openxmlformats.org/drawingml/2006/main" xmlns:r="http://schemas.openxmlformats.org/officeDocument/2006/relationships" xmlns:p="http://schemas.openxmlformats.org/presentationml/2006/main">
   <p:cSld>
     <p:spTree>
@@ -10978,8 +11236,8 @@
             </a:fontRef>
           </p:style>
         </p:cxnSp>
-        <mc:AlternateContent xmlns:mc="http://schemas.openxmlformats.org/markup-compatibility/2006">
-          <mc:Choice xmlns:a14="http://schemas.microsoft.com/office/drawing/2010/main" Requires="a14">
+        <mc:AlternateContent xmlns:mc="http://schemas.openxmlformats.org/markup-compatibility/2006" xmlns:a14="http://schemas.microsoft.com/office/drawing/2010/main">
+          <mc:Choice Requires="a14">
             <p:sp>
               <p:nvSpPr>
                 <p:cNvPr id="58" name="TextBox 57">
@@ -11035,7 +11293,7 @@
               </p:txBody>
             </p:sp>
           </mc:Choice>
-          <mc:Fallback>
+          <mc:Fallback xmlns="">
             <p:sp>
               <p:nvSpPr>
                 <p:cNvPr id="58" name="TextBox 57">
@@ -11080,8 +11338,8 @@
             </p:sp>
           </mc:Fallback>
         </mc:AlternateContent>
-        <mc:AlternateContent xmlns:mc="http://schemas.openxmlformats.org/markup-compatibility/2006">
-          <mc:Choice xmlns:a14="http://schemas.microsoft.com/office/drawing/2010/main" Requires="a14">
+        <mc:AlternateContent xmlns:mc="http://schemas.openxmlformats.org/markup-compatibility/2006" xmlns:a14="http://schemas.microsoft.com/office/drawing/2010/main">
+          <mc:Choice Requires="a14">
             <p:sp>
               <p:nvSpPr>
                 <p:cNvPr id="59" name="TextBox 58">
@@ -11137,7 +11395,7 @@
               </p:txBody>
             </p:sp>
           </mc:Choice>
-          <mc:Fallback>
+          <mc:Fallback xmlns="">
             <p:sp>
               <p:nvSpPr>
                 <p:cNvPr id="59" name="TextBox 58">
@@ -11228,8 +11486,8 @@
           </a:fontRef>
         </p:style>
       </p:cxnSp>
-      <mc:AlternateContent xmlns:mc="http://schemas.openxmlformats.org/markup-compatibility/2006">
-        <mc:Choice xmlns:a14="http://schemas.microsoft.com/office/drawing/2010/main" Requires="a14">
+      <mc:AlternateContent xmlns:mc="http://schemas.openxmlformats.org/markup-compatibility/2006" xmlns:a14="http://schemas.microsoft.com/office/drawing/2010/main">
+        <mc:Choice Requires="a14">
           <p:sp>
             <p:nvSpPr>
               <p:cNvPr id="38" name="TextBox 37">
@@ -11258,7 +11516,6 @@
               </a:bodyPr>
               <a:lstStyle/>
               <a:p>
-                <a:pPr/>
                 <a14:m>
                   <m:oMath xmlns:m="http://schemas.openxmlformats.org/officeDocument/2006/math">
                     <m:sSub>
@@ -11338,7 +11595,7 @@
             </p:txBody>
           </p:sp>
         </mc:Choice>
-        <mc:Fallback>
+        <mc:Fallback xmlns="">
           <p:sp>
             <p:nvSpPr>
               <p:cNvPr id="38" name="TextBox 37">
@@ -11520,8 +11777,8 @@
           </a:p>
         </p:txBody>
       </p:sp>
-      <mc:AlternateContent xmlns:mc="http://schemas.openxmlformats.org/markup-compatibility/2006">
-        <mc:Choice xmlns:a14="http://schemas.microsoft.com/office/drawing/2010/main" Requires="a14">
+      <mc:AlternateContent xmlns:mc="http://schemas.openxmlformats.org/markup-compatibility/2006" xmlns:a14="http://schemas.microsoft.com/office/drawing/2010/main">
+        <mc:Choice Requires="a14">
           <p:sp>
             <p:nvSpPr>
               <p:cNvPr id="3" name="Content Placeholder 2">
@@ -11649,7 +11906,7 @@
             </p:txBody>
           </p:sp>
         </mc:Choice>
-        <mc:Fallback>
+        <mc:Fallback xmlns="">
           <p:sp>
             <p:nvSpPr>
               <p:cNvPr id="3" name="Content Placeholder 2">
@@ -13356,8 +13613,8 @@
             </a:fontRef>
           </p:style>
         </p:cxnSp>
-        <mc:AlternateContent xmlns:mc="http://schemas.openxmlformats.org/markup-compatibility/2006">
-          <mc:Choice xmlns:a14="http://schemas.microsoft.com/office/drawing/2010/main" Requires="a14">
+        <mc:AlternateContent xmlns:mc="http://schemas.openxmlformats.org/markup-compatibility/2006" xmlns:a14="http://schemas.microsoft.com/office/drawing/2010/main">
+          <mc:Choice Requires="a14">
             <p:sp>
               <p:nvSpPr>
                 <p:cNvPr id="58" name="TextBox 57">
@@ -13413,7 +13670,7 @@
               </p:txBody>
             </p:sp>
           </mc:Choice>
-          <mc:Fallback>
+          <mc:Fallback xmlns="">
             <p:sp>
               <p:nvSpPr>
                 <p:cNvPr id="58" name="TextBox 57">
@@ -13458,8 +13715,8 @@
             </p:sp>
           </mc:Fallback>
         </mc:AlternateContent>
-        <mc:AlternateContent xmlns:mc="http://schemas.openxmlformats.org/markup-compatibility/2006">
-          <mc:Choice xmlns:a14="http://schemas.microsoft.com/office/drawing/2010/main" Requires="a14">
+        <mc:AlternateContent xmlns:mc="http://schemas.openxmlformats.org/markup-compatibility/2006" xmlns:a14="http://schemas.microsoft.com/office/drawing/2010/main">
+          <mc:Choice Requires="a14">
             <p:sp>
               <p:nvSpPr>
                 <p:cNvPr id="59" name="TextBox 58">
@@ -13515,7 +13772,7 @@
               </p:txBody>
             </p:sp>
           </mc:Choice>
-          <mc:Fallback>
+          <mc:Fallback xmlns="">
             <p:sp>
               <p:nvSpPr>
                 <p:cNvPr id="59" name="TextBox 58">
@@ -13606,8 +13863,8 @@
           </a:fontRef>
         </p:style>
       </p:cxnSp>
-      <mc:AlternateContent xmlns:mc="http://schemas.openxmlformats.org/markup-compatibility/2006">
-        <mc:Choice xmlns:a14="http://schemas.microsoft.com/office/drawing/2010/main" Requires="a14">
+      <mc:AlternateContent xmlns:mc="http://schemas.openxmlformats.org/markup-compatibility/2006" xmlns:a14="http://schemas.microsoft.com/office/drawing/2010/main">
+        <mc:Choice Requires="a14">
           <p:sp>
             <p:nvSpPr>
               <p:cNvPr id="38" name="TextBox 37">
@@ -13636,7 +13893,6 @@
               </a:bodyPr>
               <a:lstStyle/>
               <a:p>
-                <a:pPr/>
                 <a14:m>
                   <m:oMath xmlns:m="http://schemas.openxmlformats.org/officeDocument/2006/math">
                     <m:sSub>
@@ -13716,7 +13972,7 @@
             </p:txBody>
           </p:sp>
         </mc:Choice>
-        <mc:Fallback>
+        <mc:Fallback xmlns="">
           <p:sp>
             <p:nvSpPr>
               <p:cNvPr id="38" name="TextBox 37">
@@ -13876,8 +14132,8 @@
           </a:prstGeom>
         </p:spPr>
       </p:pic>
-      <mc:AlternateContent xmlns:mc="http://schemas.openxmlformats.org/markup-compatibility/2006">
-        <mc:Choice xmlns:a14="http://schemas.microsoft.com/office/drawing/2010/main" Requires="a14">
+      <mc:AlternateContent xmlns:mc="http://schemas.openxmlformats.org/markup-compatibility/2006" xmlns:a14="http://schemas.microsoft.com/office/drawing/2010/main">
+        <mc:Choice Requires="a14">
           <p:sp>
             <p:nvSpPr>
               <p:cNvPr id="42" name="TextBox 41">
@@ -14100,7 +14356,7 @@
             </p:txBody>
           </p:sp>
         </mc:Choice>
-        <mc:Fallback>
+        <mc:Fallback xmlns="">
           <p:sp>
             <p:nvSpPr>
               <p:cNvPr id="42" name="TextBox 41">
@@ -14645,8 +14901,8 @@
           </a:p>
         </p:txBody>
       </p:sp>
-      <mc:AlternateContent xmlns:mc="http://schemas.openxmlformats.org/markup-compatibility/2006">
-        <mc:Choice xmlns:a14="http://schemas.microsoft.com/office/drawing/2010/main" Requires="a14">
+      <mc:AlternateContent xmlns:mc="http://schemas.openxmlformats.org/markup-compatibility/2006" xmlns:a14="http://schemas.microsoft.com/office/drawing/2010/main">
+        <mc:Choice Requires="a14">
           <p:sp>
             <p:nvSpPr>
               <p:cNvPr id="3" name="Content Placeholder 2">
@@ -15142,7 +15398,7 @@
             </p:txBody>
           </p:sp>
         </mc:Choice>
-        <mc:Fallback>
+        <mc:Fallback xmlns="">
           <p:sp>
             <p:nvSpPr>
               <p:cNvPr id="3" name="Content Placeholder 2">
@@ -16018,8 +16274,8 @@
           </a:p>
         </p:txBody>
       </p:sp>
-      <mc:AlternateContent xmlns:mc="http://schemas.openxmlformats.org/markup-compatibility/2006">
-        <mc:Choice xmlns:a14="http://schemas.microsoft.com/office/drawing/2010/main" Requires="a14">
+      <mc:AlternateContent xmlns:mc="http://schemas.openxmlformats.org/markup-compatibility/2006" xmlns:a14="http://schemas.microsoft.com/office/drawing/2010/main">
+        <mc:Choice Requires="a14">
           <p:sp>
             <p:nvSpPr>
               <p:cNvPr id="65" name="TextBox 64">
@@ -16081,7 +16337,7 @@
             </p:txBody>
           </p:sp>
         </mc:Choice>
-        <mc:Fallback>
+        <mc:Fallback xmlns="">
           <p:sp>
             <p:nvSpPr>
               <p:cNvPr id="65" name="TextBox 64">
@@ -16126,8 +16382,8 @@
           </p:sp>
         </mc:Fallback>
       </mc:AlternateContent>
-      <mc:AlternateContent xmlns:mc="http://schemas.openxmlformats.org/markup-compatibility/2006">
-        <mc:Choice xmlns:a14="http://schemas.microsoft.com/office/drawing/2010/main" Requires="a14">
+      <mc:AlternateContent xmlns:mc="http://schemas.openxmlformats.org/markup-compatibility/2006" xmlns:a14="http://schemas.microsoft.com/office/drawing/2010/main">
+        <mc:Choice Requires="a14">
           <p:sp>
             <p:nvSpPr>
               <p:cNvPr id="68" name="TextBox 67">
@@ -16351,7 +16607,7 @@
             </p:txBody>
           </p:sp>
         </mc:Choice>
-        <mc:Fallback>
+        <mc:Fallback xmlns="">
           <p:sp>
             <p:nvSpPr>
               <p:cNvPr id="68" name="TextBox 67">
@@ -16500,8 +16756,8 @@
           </a:fontRef>
         </p:style>
       </p:cxnSp>
-      <mc:AlternateContent xmlns:mc="http://schemas.openxmlformats.org/markup-compatibility/2006">
-        <mc:Choice xmlns:a14="http://schemas.microsoft.com/office/drawing/2010/main" Requires="a14">
+      <mc:AlternateContent xmlns:mc="http://schemas.openxmlformats.org/markup-compatibility/2006" xmlns:a14="http://schemas.microsoft.com/office/drawing/2010/main">
+        <mc:Choice Requires="a14">
           <p:sp>
             <p:nvSpPr>
               <p:cNvPr id="67" name="TextBox 66">
@@ -16530,7 +16786,6 @@
               </a:bodyPr>
               <a:lstStyle/>
               <a:p>
-                <a:pPr/>
                 <a14:m>
                   <m:oMath xmlns:m="http://schemas.openxmlformats.org/officeDocument/2006/math">
                     <m:sSub>
@@ -16607,7 +16862,7 @@
             </p:txBody>
           </p:sp>
         </mc:Choice>
-        <mc:Fallback>
+        <mc:Fallback xmlns="">
           <p:sp>
             <p:nvSpPr>
               <p:cNvPr id="67" name="TextBox 66">
@@ -16904,8 +17159,8 @@
               </a:fontRef>
             </p:style>
           </p:cxnSp>
-          <mc:AlternateContent xmlns:mc="http://schemas.openxmlformats.org/markup-compatibility/2006">
-            <mc:Choice xmlns:a14="http://schemas.microsoft.com/office/drawing/2010/main" Requires="a14">
+          <mc:AlternateContent xmlns:mc="http://schemas.openxmlformats.org/markup-compatibility/2006" xmlns:a14="http://schemas.microsoft.com/office/drawing/2010/main">
+            <mc:Choice Requires="a14">
               <p:sp>
                 <p:nvSpPr>
                   <p:cNvPr id="72" name="TextBox 71">
@@ -16980,7 +17235,7 @@
                 </p:txBody>
               </p:sp>
             </mc:Choice>
-            <mc:Fallback>
+            <mc:Fallback xmlns="">
               <p:sp>
                 <p:nvSpPr>
                   <p:cNvPr id="72" name="TextBox 71">
@@ -17028,8 +17283,8 @@
               </p:sp>
             </mc:Fallback>
           </mc:AlternateContent>
-          <mc:AlternateContent xmlns:mc="http://schemas.openxmlformats.org/markup-compatibility/2006">
-            <mc:Choice xmlns:a14="http://schemas.microsoft.com/office/drawing/2010/main" Requires="a14">
+          <mc:AlternateContent xmlns:mc="http://schemas.openxmlformats.org/markup-compatibility/2006" xmlns:a14="http://schemas.microsoft.com/office/drawing/2010/main">
+            <mc:Choice Requires="a14">
               <p:sp>
                 <p:nvSpPr>
                   <p:cNvPr id="73" name="TextBox 72">
@@ -17104,7 +17359,7 @@
                 </p:txBody>
               </p:sp>
             </mc:Choice>
-            <mc:Fallback>
+            <mc:Fallback xmlns="">
               <p:sp>
                 <p:nvSpPr>
                   <p:cNvPr id="73" name="TextBox 72">
@@ -17168,7 +17423,7 @@
             <p:nvPr/>
           </p:nvPicPr>
           <p:blipFill>
-            <a:blip r:embed="rId8">
+            <a:blip r:embed="rId15">
               <a:duotone>
                 <a:schemeClr val="bg2">
                   <a:shade val="45000"/>
@@ -17332,8 +17587,8 @@
               </a:fontRef>
             </p:style>
           </p:cxnSp>
-          <mc:AlternateContent xmlns:mc="http://schemas.openxmlformats.org/markup-compatibility/2006">
-            <mc:Choice xmlns:a14="http://schemas.microsoft.com/office/drawing/2010/main" Requires="a14">
+          <mc:AlternateContent xmlns:mc="http://schemas.openxmlformats.org/markup-compatibility/2006" xmlns:a14="http://schemas.microsoft.com/office/drawing/2010/main">
+            <mc:Choice Requires="a14">
               <p:sp>
                 <p:nvSpPr>
                   <p:cNvPr id="80" name="TextBox 79">
@@ -17408,7 +17663,7 @@
                 </p:txBody>
               </p:sp>
             </mc:Choice>
-            <mc:Fallback>
+            <mc:Fallback xmlns="">
               <p:sp>
                 <p:nvSpPr>
                   <p:cNvPr id="80" name="TextBox 79">
@@ -17432,7 +17687,7 @@
                     <a:avLst/>
                   </a:prstGeom>
                   <a:blipFill>
-                    <a:blip r:embed="rId15"/>
+                    <a:blip r:embed="rId16"/>
                     <a:stretch>
                       <a:fillRect/>
                     </a:stretch>
@@ -17456,8 +17711,8 @@
               </p:sp>
             </mc:Fallback>
           </mc:AlternateContent>
-          <mc:AlternateContent xmlns:mc="http://schemas.openxmlformats.org/markup-compatibility/2006">
-            <mc:Choice xmlns:a14="http://schemas.microsoft.com/office/drawing/2010/main" Requires="a14">
+          <mc:AlternateContent xmlns:mc="http://schemas.openxmlformats.org/markup-compatibility/2006" xmlns:a14="http://schemas.microsoft.com/office/drawing/2010/main">
+            <mc:Choice Requires="a14">
               <p:sp>
                 <p:nvSpPr>
                   <p:cNvPr id="81" name="TextBox 80">
@@ -17532,7 +17787,7 @@
                 </p:txBody>
               </p:sp>
             </mc:Choice>
-            <mc:Fallback>
+            <mc:Fallback xmlns="">
               <p:sp>
                 <p:nvSpPr>
                   <p:cNvPr id="81" name="TextBox 80">
@@ -17556,7 +17811,7 @@
                     <a:avLst/>
                   </a:prstGeom>
                   <a:blipFill>
-                    <a:blip r:embed="rId16"/>
+                    <a:blip r:embed="rId17"/>
                     <a:stretch>
                       <a:fillRect/>
                     </a:stretch>
@@ -17596,7 +17851,7 @@
             <p:nvPr/>
           </p:nvPicPr>
           <p:blipFill>
-            <a:blip r:embed="rId8">
+            <a:blip r:embed="rId15">
               <a:duotone>
                 <a:schemeClr val="bg2">
                   <a:shade val="45000"/>
@@ -17810,8 +18065,8 @@
               </a:fontRef>
             </p:style>
           </p:cxnSp>
-          <mc:AlternateContent xmlns:mc="http://schemas.openxmlformats.org/markup-compatibility/2006">
-            <mc:Choice xmlns:a14="http://schemas.microsoft.com/office/drawing/2010/main" Requires="a14">
+          <mc:AlternateContent xmlns:mc="http://schemas.openxmlformats.org/markup-compatibility/2006" xmlns:a14="http://schemas.microsoft.com/office/drawing/2010/main">
+            <mc:Choice Requires="a14">
               <p:sp>
                 <p:nvSpPr>
                   <p:cNvPr id="34" name="TextBox 33">
@@ -17867,7 +18122,7 @@
                 </p:txBody>
               </p:sp>
             </mc:Choice>
-            <mc:Fallback>
+            <mc:Fallback xmlns="">
               <p:sp>
                 <p:nvSpPr>
                   <p:cNvPr id="34" name="TextBox 33">
@@ -17891,7 +18146,7 @@
                     <a:avLst/>
                   </a:prstGeom>
                   <a:blipFill>
-                    <a:blip r:embed="rId17"/>
+                    <a:blip r:embed="rId18"/>
                     <a:stretch>
                       <a:fillRect b="-2083"/>
                     </a:stretch>
@@ -17912,8 +18167,8 @@
               </p:sp>
             </mc:Fallback>
           </mc:AlternateContent>
-          <mc:AlternateContent xmlns:mc="http://schemas.openxmlformats.org/markup-compatibility/2006">
-            <mc:Choice xmlns:a14="http://schemas.microsoft.com/office/drawing/2010/main" Requires="a14">
+          <mc:AlternateContent xmlns:mc="http://schemas.openxmlformats.org/markup-compatibility/2006" xmlns:a14="http://schemas.microsoft.com/office/drawing/2010/main">
+            <mc:Choice Requires="a14">
               <p:sp>
                 <p:nvSpPr>
                   <p:cNvPr id="35" name="TextBox 34">
@@ -17969,7 +18224,7 @@
                 </p:txBody>
               </p:sp>
             </mc:Choice>
-            <mc:Fallback>
+            <mc:Fallback xmlns="">
               <p:sp>
                 <p:nvSpPr>
                   <p:cNvPr id="35" name="TextBox 34">
@@ -17993,7 +18248,7 @@
                     <a:avLst/>
                   </a:prstGeom>
                   <a:blipFill>
-                    <a:blip r:embed="rId18"/>
+                    <a:blip r:embed="rId19"/>
                     <a:stretch>
                       <a:fillRect/>
                     </a:stretch>
@@ -18030,7 +18285,7 @@
             <p:nvPr/>
           </p:nvPicPr>
           <p:blipFill>
-            <a:blip r:embed="rId8">
+            <a:blip r:embed="rId15">
               <a:extLst>
                 <a:ext uri="{28A0092B-C50C-407E-A947-70E740481C1C}">
                   <a14:useLocalDpi xmlns:a14="http://schemas.microsoft.com/office/drawing/2010/main" val="0"/>
@@ -18097,8 +18352,8 @@
           </a:fontRef>
         </p:style>
       </p:cxnSp>
-      <mc:AlternateContent xmlns:mc="http://schemas.openxmlformats.org/markup-compatibility/2006">
-        <mc:Choice xmlns:a14="http://schemas.microsoft.com/office/drawing/2010/main" Requires="a14">
+      <mc:AlternateContent xmlns:mc="http://schemas.openxmlformats.org/markup-compatibility/2006" xmlns:a14="http://schemas.microsoft.com/office/drawing/2010/main">
+        <mc:Choice Requires="a14">
           <p:sp>
             <p:nvSpPr>
               <p:cNvPr id="66" name="TextBox 65">
@@ -18197,7 +18452,7 @@
             </p:txBody>
           </p:sp>
         </mc:Choice>
-        <mc:Fallback>
+        <mc:Fallback xmlns="">
           <p:sp>
             <p:nvSpPr>
               <p:cNvPr id="66" name="TextBox 65">
@@ -18221,7 +18476,7 @@
                 <a:avLst/>
               </a:prstGeom>
               <a:blipFill>
-                <a:blip r:embed="rId19"/>
+                <a:blip r:embed="rId20"/>
                 <a:stretch>
                   <a:fillRect t="-3125" b="-9375"/>
                 </a:stretch>
@@ -18341,8 +18596,8 @@
           </a:fontRef>
         </p:style>
       </p:cxnSp>
-      <mc:AlternateContent xmlns:mc="http://schemas.openxmlformats.org/markup-compatibility/2006">
-        <mc:Choice xmlns:a14="http://schemas.microsoft.com/office/drawing/2010/main" Requires="a14">
+      <mc:AlternateContent xmlns:mc="http://schemas.openxmlformats.org/markup-compatibility/2006" xmlns:a14="http://schemas.microsoft.com/office/drawing/2010/main">
+        <mc:Choice Requires="a14">
           <p:sp>
             <p:nvSpPr>
               <p:cNvPr id="85" name="TextBox 84">
@@ -18426,7 +18681,7 @@
             </p:txBody>
           </p:sp>
         </mc:Choice>
-        <mc:Fallback>
+        <mc:Fallback xmlns="">
           <p:sp>
             <p:nvSpPr>
               <p:cNvPr id="85" name="TextBox 84">
@@ -18450,7 +18705,7 @@
                 <a:avLst/>
               </a:prstGeom>
               <a:blipFill>
-                <a:blip r:embed="rId20"/>
+                <a:blip r:embed="rId21"/>
                 <a:stretch>
                   <a:fillRect/>
                 </a:stretch>
@@ -19031,8 +19286,8 @@
           </a:p>
         </p:txBody>
       </p:sp>
-      <mc:AlternateContent xmlns:mc="http://schemas.openxmlformats.org/markup-compatibility/2006">
-        <mc:Choice xmlns:a14="http://schemas.microsoft.com/office/drawing/2010/main" Requires="a14">
+      <mc:AlternateContent xmlns:mc="http://schemas.openxmlformats.org/markup-compatibility/2006" xmlns:a14="http://schemas.microsoft.com/office/drawing/2010/main">
+        <mc:Choice Requires="a14">
           <p:sp>
             <p:nvSpPr>
               <p:cNvPr id="3" name="Content Placeholder 2">
@@ -19454,7 +19709,7 @@
             </p:txBody>
           </p:sp>
         </mc:Choice>
-        <mc:Fallback>
+        <mc:Fallback xmlns="">
           <p:sp>
             <p:nvSpPr>
               <p:cNvPr id="3" name="Content Placeholder 2">
@@ -20000,8 +20255,8 @@
           </a:p>
         </p:txBody>
       </p:sp>
-      <mc:AlternateContent xmlns:mc="http://schemas.openxmlformats.org/markup-compatibility/2006">
-        <mc:Choice xmlns:a14="http://schemas.microsoft.com/office/drawing/2010/main" Requires="a14">
+      <mc:AlternateContent xmlns:mc="http://schemas.openxmlformats.org/markup-compatibility/2006" xmlns:a14="http://schemas.microsoft.com/office/drawing/2010/main">
+        <mc:Choice Requires="a14">
           <p:sp>
             <p:nvSpPr>
               <p:cNvPr id="65" name="TextBox 64">
@@ -20063,7 +20318,7 @@
             </p:txBody>
           </p:sp>
         </mc:Choice>
-        <mc:Fallback>
+        <mc:Fallback xmlns="">
           <p:sp>
             <p:nvSpPr>
               <p:cNvPr id="65" name="TextBox 64">
@@ -20212,8 +20467,8 @@
           </a:fontRef>
         </p:style>
       </p:cxnSp>
-      <mc:AlternateContent xmlns:mc="http://schemas.openxmlformats.org/markup-compatibility/2006">
-        <mc:Choice xmlns:a14="http://schemas.microsoft.com/office/drawing/2010/main" Requires="a14">
+      <mc:AlternateContent xmlns:mc="http://schemas.openxmlformats.org/markup-compatibility/2006" xmlns:a14="http://schemas.microsoft.com/office/drawing/2010/main">
+        <mc:Choice Requires="a14">
           <p:sp>
             <p:nvSpPr>
               <p:cNvPr id="67" name="TextBox 66">
@@ -20242,7 +20497,6 @@
               </a:bodyPr>
               <a:lstStyle/>
               <a:p>
-                <a:pPr/>
                 <a14:m>
                   <m:oMath xmlns:m="http://schemas.openxmlformats.org/officeDocument/2006/math">
                     <m:sSub>
@@ -20319,7 +20573,7 @@
             </p:txBody>
           </p:sp>
         </mc:Choice>
-        <mc:Fallback>
+        <mc:Fallback xmlns="">
           <p:sp>
             <p:nvSpPr>
               <p:cNvPr id="67" name="TextBox 66">
@@ -20616,8 +20870,8 @@
               </a:fontRef>
             </p:style>
           </p:cxnSp>
-          <mc:AlternateContent xmlns:mc="http://schemas.openxmlformats.org/markup-compatibility/2006">
-            <mc:Choice xmlns:a14="http://schemas.microsoft.com/office/drawing/2010/main" Requires="a14">
+          <mc:AlternateContent xmlns:mc="http://schemas.openxmlformats.org/markup-compatibility/2006" xmlns:a14="http://schemas.microsoft.com/office/drawing/2010/main">
+            <mc:Choice Requires="a14">
               <p:sp>
                 <p:nvSpPr>
                   <p:cNvPr id="72" name="TextBox 71">
@@ -20692,7 +20946,7 @@
                 </p:txBody>
               </p:sp>
             </mc:Choice>
-            <mc:Fallback>
+            <mc:Fallback xmlns="">
               <p:sp>
                 <p:nvSpPr>
                   <p:cNvPr id="72" name="TextBox 71">
@@ -20740,8 +20994,8 @@
               </p:sp>
             </mc:Fallback>
           </mc:AlternateContent>
-          <mc:AlternateContent xmlns:mc="http://schemas.openxmlformats.org/markup-compatibility/2006">
-            <mc:Choice xmlns:a14="http://schemas.microsoft.com/office/drawing/2010/main" Requires="a14">
+          <mc:AlternateContent xmlns:mc="http://schemas.openxmlformats.org/markup-compatibility/2006" xmlns:a14="http://schemas.microsoft.com/office/drawing/2010/main">
+            <mc:Choice Requires="a14">
               <p:sp>
                 <p:nvSpPr>
                   <p:cNvPr id="73" name="TextBox 72">
@@ -20816,7 +21070,7 @@
                 </p:txBody>
               </p:sp>
             </mc:Choice>
-            <mc:Fallback>
+            <mc:Fallback xmlns="">
               <p:sp>
                 <p:nvSpPr>
                   <p:cNvPr id="73" name="TextBox 72">
@@ -21044,8 +21298,8 @@
               </a:fontRef>
             </p:style>
           </p:cxnSp>
-          <mc:AlternateContent xmlns:mc="http://schemas.openxmlformats.org/markup-compatibility/2006">
-            <mc:Choice xmlns:a14="http://schemas.microsoft.com/office/drawing/2010/main" Requires="a14">
+          <mc:AlternateContent xmlns:mc="http://schemas.openxmlformats.org/markup-compatibility/2006" xmlns:a14="http://schemas.microsoft.com/office/drawing/2010/main">
+            <mc:Choice Requires="a14">
               <p:sp>
                 <p:nvSpPr>
                   <p:cNvPr id="80" name="TextBox 79">
@@ -21120,7 +21374,7 @@
                 </p:txBody>
               </p:sp>
             </mc:Choice>
-            <mc:Fallback>
+            <mc:Fallback xmlns="">
               <p:sp>
                 <p:nvSpPr>
                   <p:cNvPr id="80" name="TextBox 79">
@@ -21168,8 +21422,8 @@
               </p:sp>
             </mc:Fallback>
           </mc:AlternateContent>
-          <mc:AlternateContent xmlns:mc="http://schemas.openxmlformats.org/markup-compatibility/2006">
-            <mc:Choice xmlns:a14="http://schemas.microsoft.com/office/drawing/2010/main" Requires="a14">
+          <mc:AlternateContent xmlns:mc="http://schemas.openxmlformats.org/markup-compatibility/2006" xmlns:a14="http://schemas.microsoft.com/office/drawing/2010/main">
+            <mc:Choice Requires="a14">
               <p:sp>
                 <p:nvSpPr>
                   <p:cNvPr id="81" name="TextBox 80">
@@ -21244,7 +21498,7 @@
                 </p:txBody>
               </p:sp>
             </mc:Choice>
-            <mc:Fallback>
+            <mc:Fallback xmlns="">
               <p:sp>
                 <p:nvSpPr>
                   <p:cNvPr id="81" name="TextBox 80">
@@ -21522,8 +21776,8 @@
               </a:fontRef>
             </p:style>
           </p:cxnSp>
-          <mc:AlternateContent xmlns:mc="http://schemas.openxmlformats.org/markup-compatibility/2006">
-            <mc:Choice xmlns:a14="http://schemas.microsoft.com/office/drawing/2010/main" Requires="a14">
+          <mc:AlternateContent xmlns:mc="http://schemas.openxmlformats.org/markup-compatibility/2006" xmlns:a14="http://schemas.microsoft.com/office/drawing/2010/main">
+            <mc:Choice Requires="a14">
               <p:sp>
                 <p:nvSpPr>
                   <p:cNvPr id="34" name="TextBox 33">
@@ -21579,7 +21833,7 @@
                 </p:txBody>
               </p:sp>
             </mc:Choice>
-            <mc:Fallback>
+            <mc:Fallback xmlns="">
               <p:sp>
                 <p:nvSpPr>
                   <p:cNvPr id="34" name="TextBox 33">
@@ -21624,8 +21878,8 @@
               </p:sp>
             </mc:Fallback>
           </mc:AlternateContent>
-          <mc:AlternateContent xmlns:mc="http://schemas.openxmlformats.org/markup-compatibility/2006">
-            <mc:Choice xmlns:a14="http://schemas.microsoft.com/office/drawing/2010/main" Requires="a14">
+          <mc:AlternateContent xmlns:mc="http://schemas.openxmlformats.org/markup-compatibility/2006" xmlns:a14="http://schemas.microsoft.com/office/drawing/2010/main">
+            <mc:Choice Requires="a14">
               <p:sp>
                 <p:nvSpPr>
                   <p:cNvPr id="35" name="TextBox 34">
@@ -21681,7 +21935,7 @@
                 </p:txBody>
               </p:sp>
             </mc:Choice>
-            <mc:Fallback>
+            <mc:Fallback xmlns="">
               <p:sp>
                 <p:nvSpPr>
                   <p:cNvPr id="35" name="TextBox 34">
@@ -21809,8 +22063,8 @@
           </a:fontRef>
         </p:style>
       </p:cxnSp>
-      <mc:AlternateContent xmlns:mc="http://schemas.openxmlformats.org/markup-compatibility/2006">
-        <mc:Choice xmlns:a14="http://schemas.microsoft.com/office/drawing/2010/main" Requires="a14">
+      <mc:AlternateContent xmlns:mc="http://schemas.openxmlformats.org/markup-compatibility/2006" xmlns:a14="http://schemas.microsoft.com/office/drawing/2010/main">
+        <mc:Choice Requires="a14">
           <p:sp>
             <p:nvSpPr>
               <p:cNvPr id="66" name="TextBox 65">
@@ -21909,7 +22163,7 @@
             </p:txBody>
           </p:sp>
         </mc:Choice>
-        <mc:Fallback>
+        <mc:Fallback xmlns="">
           <p:sp>
             <p:nvSpPr>
               <p:cNvPr id="66" name="TextBox 65">
@@ -22053,8 +22307,8 @@
           </a:fontRef>
         </p:style>
       </p:cxnSp>
-      <mc:AlternateContent xmlns:mc="http://schemas.openxmlformats.org/markup-compatibility/2006">
-        <mc:Choice xmlns:a14="http://schemas.microsoft.com/office/drawing/2010/main" Requires="a14">
+      <mc:AlternateContent xmlns:mc="http://schemas.openxmlformats.org/markup-compatibility/2006" xmlns:a14="http://schemas.microsoft.com/office/drawing/2010/main">
+        <mc:Choice Requires="a14">
           <p:sp>
             <p:nvSpPr>
               <p:cNvPr id="85" name="TextBox 84">
@@ -22138,7 +22392,7 @@
             </p:txBody>
           </p:sp>
         </mc:Choice>
-        <mc:Fallback>
+        <mc:Fallback xmlns="">
           <p:sp>
             <p:nvSpPr>
               <p:cNvPr id="85" name="TextBox 84">
@@ -22183,8 +22437,8 @@
           </p:sp>
         </mc:Fallback>
       </mc:AlternateContent>
-      <mc:AlternateContent xmlns:mc="http://schemas.openxmlformats.org/markup-compatibility/2006">
-        <mc:Choice xmlns:a14="http://schemas.microsoft.com/office/drawing/2010/main" Requires="a14">
+      <mc:AlternateContent xmlns:mc="http://schemas.openxmlformats.org/markup-compatibility/2006" xmlns:a14="http://schemas.microsoft.com/office/drawing/2010/main">
+        <mc:Choice Requires="a14">
           <p:sp>
             <p:nvSpPr>
               <p:cNvPr id="86" name="TextBox 85">
@@ -22408,7 +22662,7 @@
             </p:txBody>
           </p:sp>
         </mc:Choice>
-        <mc:Fallback>
+        <mc:Fallback xmlns="">
           <p:sp>
             <p:nvSpPr>
               <p:cNvPr id="86" name="TextBox 85">
@@ -22835,8 +23089,8 @@
           </a:p>
         </p:txBody>
       </p:sp>
-      <mc:AlternateContent xmlns:mc="http://schemas.openxmlformats.org/markup-compatibility/2006">
-        <mc:Choice xmlns:a14="http://schemas.microsoft.com/office/drawing/2010/main" Requires="a14">
+      <mc:AlternateContent xmlns:mc="http://schemas.openxmlformats.org/markup-compatibility/2006" xmlns:a14="http://schemas.microsoft.com/office/drawing/2010/main">
+        <mc:Choice Requires="a14">
           <p:sp>
             <p:nvSpPr>
               <p:cNvPr id="3" name="Content Placeholder 2"/>
@@ -24774,13 +25028,7 @@
                         <a:rPr lang="en-CA" i="1" dirty="0">
                           <a:latin typeface="Cambria Math" panose="02040503050406030204" pitchFamily="18" charset="0"/>
                         </a:rPr>
-                        <m:t>+</m:t>
-                      </m:r>
-                      <m:r>
-                        <a:rPr lang="en-CA" i="1" dirty="0">
-                          <a:latin typeface="Cambria Math" panose="02040503050406030204" pitchFamily="18" charset="0"/>
-                        </a:rPr>
-                        <m:t>2</m:t>
+                        <m:t>+2</m:t>
                       </m:r>
                       <m:sSub>
                         <m:sSubPr>
@@ -25099,7 +25347,7 @@
             </p:txBody>
           </p:sp>
         </mc:Choice>
-        <mc:Fallback>
+        <mc:Fallback xmlns="">
           <p:sp>
             <p:nvSpPr>
               <p:cNvPr id="3" name="Content Placeholder 2"/>
@@ -25210,8 +25458,8 @@
           </a:p>
         </p:txBody>
       </p:sp>
-      <mc:AlternateContent xmlns:mc="http://schemas.openxmlformats.org/markup-compatibility/2006">
-        <mc:Choice xmlns:a14="http://schemas.microsoft.com/office/drawing/2010/main" Requires="a14">
+      <mc:AlternateContent xmlns:mc="http://schemas.openxmlformats.org/markup-compatibility/2006" xmlns:a14="http://schemas.microsoft.com/office/drawing/2010/main">
+        <mc:Choice Requires="a14">
           <p:sp>
             <p:nvSpPr>
               <p:cNvPr id="3" name="Content Placeholder 2"/>
@@ -25420,7 +25668,7 @@
             </p:txBody>
           </p:sp>
         </mc:Choice>
-        <mc:Fallback>
+        <mc:Fallback xmlns="">
           <p:sp>
             <p:nvSpPr>
               <p:cNvPr id="3" name="Content Placeholder 2"/>
@@ -25487,186 +25735,6 @@
   <p:clrMapOvr>
     <a:masterClrMapping/>
   </p:clrMapOvr>
-  <p:timing>
-    <p:tnLst>
-      <p:par>
-        <p:cTn id="1" dur="indefinite" restart="never" nodeType="tmRoot">
-          <p:childTnLst>
-            <p:seq concurrent="1" nextAc="seek">
-              <p:cTn id="2" dur="indefinite" nodeType="mainSeq">
-                <p:childTnLst>
-                  <p:par>
-                    <p:cTn id="3" fill="hold">
-                      <p:stCondLst>
-                        <p:cond delay="indefinite"/>
-                      </p:stCondLst>
-                      <p:childTnLst>
-                        <p:par>
-                          <p:cTn id="4" fill="hold">
-                            <p:stCondLst>
-                              <p:cond delay="0"/>
-                            </p:stCondLst>
-                            <p:childTnLst>
-                              <p:par>
-                                <p:cTn id="5" presetID="1" presetClass="entr" presetSubtype="0" fill="hold" grpId="0" nodeType="clickEffect">
-                                  <p:stCondLst>
-                                    <p:cond delay="0"/>
-                                  </p:stCondLst>
-                                  <p:childTnLst>
-                                    <p:set>
-                                      <p:cBhvr>
-                                        <p:cTn id="6" dur="1" fill="hold">
-                                          <p:stCondLst>
-                                            <p:cond delay="0"/>
-                                          </p:stCondLst>
-                                        </p:cTn>
-                                        <p:tgtEl>
-                                          <p:spTgt spid="3">
-                                            <p:txEl>
-                                              <p:pRg st="0" end="0"/>
-                                            </p:txEl>
-                                          </p:spTgt>
-                                        </p:tgtEl>
-                                        <p:attrNameLst>
-                                          <p:attrName>style.visibility</p:attrName>
-                                        </p:attrNameLst>
-                                      </p:cBhvr>
-                                      <p:to>
-                                        <p:strVal val="visible"/>
-                                      </p:to>
-                                    </p:set>
-                                  </p:childTnLst>
-                                </p:cTn>
-                              </p:par>
-                            </p:childTnLst>
-                          </p:cTn>
-                        </p:par>
-                      </p:childTnLst>
-                    </p:cTn>
-                  </p:par>
-                  <p:par>
-                    <p:cTn id="7" fill="hold">
-                      <p:stCondLst>
-                        <p:cond delay="indefinite"/>
-                      </p:stCondLst>
-                      <p:childTnLst>
-                        <p:par>
-                          <p:cTn id="8" fill="hold">
-                            <p:stCondLst>
-                              <p:cond delay="0"/>
-                            </p:stCondLst>
-                            <p:childTnLst>
-                              <p:par>
-                                <p:cTn id="9" presetID="1" presetClass="entr" presetSubtype="0" fill="hold" grpId="0" nodeType="clickEffect">
-                                  <p:stCondLst>
-                                    <p:cond delay="0"/>
-                                  </p:stCondLst>
-                                  <p:childTnLst>
-                                    <p:set>
-                                      <p:cBhvr>
-                                        <p:cTn id="10" dur="1" fill="hold">
-                                          <p:stCondLst>
-                                            <p:cond delay="0"/>
-                                          </p:stCondLst>
-                                        </p:cTn>
-                                        <p:tgtEl>
-                                          <p:spTgt spid="3">
-                                            <p:txEl>
-                                              <p:pRg st="1" end="1"/>
-                                            </p:txEl>
-                                          </p:spTgt>
-                                        </p:tgtEl>
-                                        <p:attrNameLst>
-                                          <p:attrName>style.visibility</p:attrName>
-                                        </p:attrNameLst>
-                                      </p:cBhvr>
-                                      <p:to>
-                                        <p:strVal val="visible"/>
-                                      </p:to>
-                                    </p:set>
-                                  </p:childTnLst>
-                                </p:cTn>
-                              </p:par>
-                            </p:childTnLst>
-                          </p:cTn>
-                        </p:par>
-                      </p:childTnLst>
-                    </p:cTn>
-                  </p:par>
-                  <p:par>
-                    <p:cTn id="11" fill="hold">
-                      <p:stCondLst>
-                        <p:cond delay="indefinite"/>
-                      </p:stCondLst>
-                      <p:childTnLst>
-                        <p:par>
-                          <p:cTn id="12" fill="hold">
-                            <p:stCondLst>
-                              <p:cond delay="0"/>
-                            </p:stCondLst>
-                            <p:childTnLst>
-                              <p:par>
-                                <p:cTn id="13" presetID="1" presetClass="entr" presetSubtype="0" fill="hold" grpId="0" nodeType="clickEffect">
-                                  <p:stCondLst>
-                                    <p:cond delay="0"/>
-                                  </p:stCondLst>
-                                  <p:childTnLst>
-                                    <p:set>
-                                      <p:cBhvr>
-                                        <p:cTn id="14" dur="1" fill="hold">
-                                          <p:stCondLst>
-                                            <p:cond delay="0"/>
-                                          </p:stCondLst>
-                                        </p:cTn>
-                                        <p:tgtEl>
-                                          <p:spTgt spid="3">
-                                            <p:txEl>
-                                              <p:pRg st="2" end="2"/>
-                                            </p:txEl>
-                                          </p:spTgt>
-                                        </p:tgtEl>
-                                        <p:attrNameLst>
-                                          <p:attrName>style.visibility</p:attrName>
-                                        </p:attrNameLst>
-                                      </p:cBhvr>
-                                      <p:to>
-                                        <p:strVal val="visible"/>
-                                      </p:to>
-                                    </p:set>
-                                  </p:childTnLst>
-                                </p:cTn>
-                              </p:par>
-                            </p:childTnLst>
-                          </p:cTn>
-                        </p:par>
-                      </p:childTnLst>
-                    </p:cTn>
-                  </p:par>
-                </p:childTnLst>
-              </p:cTn>
-              <p:prevCondLst>
-                <p:cond evt="onPrev" delay="0">
-                  <p:tgtEl>
-                    <p:sldTgt/>
-                  </p:tgtEl>
-                </p:cond>
-              </p:prevCondLst>
-              <p:nextCondLst>
-                <p:cond evt="onNext" delay="0">
-                  <p:tgtEl>
-                    <p:sldTgt/>
-                  </p:tgtEl>
-                </p:cond>
-              </p:nextCondLst>
-            </p:seq>
-          </p:childTnLst>
-        </p:cTn>
-      </p:par>
-    </p:tnLst>
-    <p:bldLst>
-      <p:bldP spid="3" grpId="0" build="p"/>
-    </p:bldLst>
-  </p:timing>
 </p:sld>
 </file>
 
@@ -26241,21 +26309,6 @@
 </file>
 
 <file path=customXml/item1.xml><?xml version="1.0" encoding="utf-8"?>
-<?mso-contentType ?>
-<FormTemplates xmlns="http://schemas.microsoft.com/sharepoint/v3/contenttype/forms">
-  <Display>DocumentLibraryForm</Display>
-  <Edit>DocumentLibraryForm</Edit>
-  <New>DocumentLibraryForm</New>
-</FormTemplates>
-</file>
-
-<file path=customXml/item2.xml><?xml version="1.0" encoding="utf-8"?>
-<p:properties xmlns:p="http://schemas.microsoft.com/office/2006/metadata/properties" xmlns:xsi="http://www.w3.org/2001/XMLSchema-instance" xmlns:pc="http://schemas.microsoft.com/office/infopath/2007/PartnerControls">
-  <documentManagement/>
-</p:properties>
-</file>
-
-<file path=customXml/item3.xml><?xml version="1.0" encoding="utf-8"?>
 <ct:contentTypeSchema xmlns:ct="http://schemas.microsoft.com/office/2006/metadata/contentType" xmlns:ma="http://schemas.microsoft.com/office/2006/metadata/properties/metaAttributes" ct:_="" ma:_="" ma:contentTypeName="Document" ma:contentTypeID="0x010100A06DF21F5BB2734A800ED30F3F452129" ma:contentTypeVersion="12" ma:contentTypeDescription="Create a new document." ma:contentTypeScope="" ma:versionID="544d96a5fbac5de9d5d902b535c73fb2">
   <xsd:schema xmlns:xsd="http://www.w3.org/2001/XMLSchema" xmlns:xs="http://www.w3.org/2001/XMLSchema" xmlns:p="http://schemas.microsoft.com/office/2006/metadata/properties" xmlns:ns3="90d05cb5-950f-4f68-bc2c-e17794455b92" xmlns:ns4="b4eab9fa-dbb0-4082-8491-8bd54207a265" targetNamespace="http://schemas.microsoft.com/office/2006/metadata/properties" ma:root="true" ma:fieldsID="7a710efc71c2169bf9c05e5a40dddf12" ns3:_="" ns4:_="">
     <xsd:import namespace="90d05cb5-950f-4f68-bc2c-e17794455b92"/>
@@ -26472,10 +26525,36 @@
 </ct:contentTypeSchema>
 </file>
 
+<file path=customXml/item2.xml><?xml version="1.0" encoding="utf-8"?>
+<p:properties xmlns:p="http://schemas.microsoft.com/office/2006/metadata/properties" xmlns:xsi="http://www.w3.org/2001/XMLSchema-instance" xmlns:pc="http://schemas.microsoft.com/office/infopath/2007/PartnerControls">
+  <documentManagement/>
+</p:properties>
+</file>
+
+<file path=customXml/item3.xml><?xml version="1.0" encoding="utf-8"?>
+<?mso-contentType ?>
+<FormTemplates xmlns="http://schemas.microsoft.com/sharepoint/v3/contenttype/forms">
+  <Display>DocumentLibraryForm</Display>
+  <Edit>DocumentLibraryForm</Edit>
+  <New>DocumentLibraryForm</New>
+</FormTemplates>
+</file>
+
 <file path=customXml/itemProps1.xml><?xml version="1.0" encoding="utf-8"?>
-<ds:datastoreItem xmlns:ds="http://schemas.openxmlformats.org/officeDocument/2006/customXml" ds:itemID="{F5CF5F32-56DC-4068-8B04-457CF34A96F3}">
+<ds:datastoreItem xmlns:ds="http://schemas.openxmlformats.org/officeDocument/2006/customXml" ds:itemID="{A43B8A4B-79FE-4529-931C-D64224FA70E3}">
   <ds:schemaRefs>
-    <ds:schemaRef ds:uri="http://schemas.microsoft.com/sharepoint/v3/contenttype/forms"/>
+    <ds:schemaRef ds:uri="http://schemas.microsoft.com/office/2006/metadata/contentType"/>
+    <ds:schemaRef ds:uri="http://schemas.microsoft.com/office/2006/metadata/properties/metaAttributes"/>
+    <ds:schemaRef ds:uri="http://www.w3.org/2001/XMLSchema"/>
+    <ds:schemaRef ds:uri="http://schemas.microsoft.com/office/2006/metadata/properties"/>
+    <ds:schemaRef ds:uri="90d05cb5-950f-4f68-bc2c-e17794455b92"/>
+    <ds:schemaRef ds:uri="b4eab9fa-dbb0-4082-8491-8bd54207a265"/>
+    <ds:schemaRef ds:uri="http://schemas.microsoft.com/office/2006/documentManagement/types"/>
+    <ds:schemaRef ds:uri="http://schemas.microsoft.com/office/infopath/2007/PartnerControls"/>
+    <ds:schemaRef ds:uri="http://schemas.openxmlformats.org/package/2006/metadata/core-properties"/>
+    <ds:schemaRef ds:uri="http://purl.org/dc/elements/1.1/"/>
+    <ds:schemaRef ds:uri="http://purl.org/dc/terms/"/>
+    <ds:schemaRef ds:uri="http://schemas.microsoft.com/internal/obd"/>
   </ds:schemaRefs>
 </ds:datastoreItem>
 </file>
@@ -26498,20 +26577,9 @@
 </file>
 
 <file path=customXml/itemProps3.xml><?xml version="1.0" encoding="utf-8"?>
-<ds:datastoreItem xmlns:ds="http://schemas.openxmlformats.org/officeDocument/2006/customXml" ds:itemID="{A43B8A4B-79FE-4529-931C-D64224FA70E3}">
+<ds:datastoreItem xmlns:ds="http://schemas.openxmlformats.org/officeDocument/2006/customXml" ds:itemID="{F5CF5F32-56DC-4068-8B04-457CF34A96F3}">
   <ds:schemaRefs>
-    <ds:schemaRef ds:uri="http://schemas.microsoft.com/office/2006/metadata/contentType"/>
-    <ds:schemaRef ds:uri="http://schemas.microsoft.com/office/2006/metadata/properties/metaAttributes"/>
-    <ds:schemaRef ds:uri="http://www.w3.org/2001/XMLSchema"/>
-    <ds:schemaRef ds:uri="http://schemas.microsoft.com/office/2006/metadata/properties"/>
-    <ds:schemaRef ds:uri="90d05cb5-950f-4f68-bc2c-e17794455b92"/>
-    <ds:schemaRef ds:uri="b4eab9fa-dbb0-4082-8491-8bd54207a265"/>
-    <ds:schemaRef ds:uri="http://schemas.microsoft.com/office/2006/documentManagement/types"/>
-    <ds:schemaRef ds:uri="http://schemas.microsoft.com/office/infopath/2007/PartnerControls"/>
-    <ds:schemaRef ds:uri="http://schemas.openxmlformats.org/package/2006/metadata/core-properties"/>
-    <ds:schemaRef ds:uri="http://purl.org/dc/elements/1.1/"/>
-    <ds:schemaRef ds:uri="http://purl.org/dc/terms/"/>
-    <ds:schemaRef ds:uri="http://schemas.microsoft.com/internal/obd"/>
+    <ds:schemaRef ds:uri="http://schemas.microsoft.com/sharepoint/v3/contenttype/forms"/>
   </ds:schemaRefs>
 </ds:datastoreItem>
 </file>
</xml_diff>

<commit_message>
Final (?) updates to kinematics
</commit_message>
<xml_diff>
--- a/Lecture Slides/VideoLectureSlides/12.8 vector.pptx
+++ b/Lecture Slides/VideoLectureSlides/12.8 vector.pptx
@@ -4049,111 +4049,216 @@
           </a:p>
         </p:txBody>
       </p:sp>
-      <p:sp>
-        <p:nvSpPr>
-          <p:cNvPr id="3" name="Content Placeholder 2">
-            <a:extLst>
-              <a:ext uri="{FF2B5EF4-FFF2-40B4-BE49-F238E27FC236}">
-                <a16:creationId xmlns:a16="http://schemas.microsoft.com/office/drawing/2014/main" id="{21A3E3C7-5743-41B3-AD91-340BF58A1800}"/>
-              </a:ext>
-            </a:extLst>
-          </p:cNvPr>
-          <p:cNvSpPr>
-            <a:spLocks noGrp="1"/>
-          </p:cNvSpPr>
-          <p:nvPr>
-            <p:ph idx="1"/>
-          </p:nvPr>
-        </p:nvSpPr>
-        <p:spPr>
-          <a:xfrm>
-            <a:off x="457200" y="1417638"/>
-            <a:ext cx="8229600" cy="4983162"/>
-          </a:xfrm>
-        </p:spPr>
-        <p:txBody>
-          <a:bodyPr>
-            <a:normAutofit fontScale="70000" lnSpcReduction="20000"/>
-          </a:bodyPr>
-          <a:lstStyle/>
-          <a:p>
-            <a:r>
-              <a:rPr lang="en-US" dirty="0"/>
-              <a:t>Start by creating a diagram of the body, with the key distances and angles labeled</a:t>
-            </a:r>
-          </a:p>
-          <a:p>
-            <a:pPr lvl="1"/>
-            <a:r>
-              <a:rPr lang="en-US" dirty="0"/>
-              <a:t>Be sure to add a fixed coordinate system (x and y directions)</a:t>
-            </a:r>
-          </a:p>
-          <a:p>
-            <a:pPr lvl="1"/>
-            <a:r>
-              <a:rPr lang="en-US" dirty="0"/>
-              <a:t>Add a rotating coordinate system (on the body that views the non-pinned body) and identify the angular </a:t>
-            </a:r>
-            <a:r>
-              <a:rPr lang="en-US" i="1" dirty="0"/>
-              <a:t>v</a:t>
-            </a:r>
-            <a:r>
-              <a:rPr lang="en-US" dirty="0"/>
-              <a:t> and </a:t>
-            </a:r>
-            <a:r>
-              <a:rPr lang="en-US" i="1" dirty="0"/>
-              <a:t>a</a:t>
-            </a:r>
-            <a:r>
-              <a:rPr lang="en-US" dirty="0"/>
-              <a:t> of the frame</a:t>
-            </a:r>
-          </a:p>
-          <a:p>
-            <a:pPr lvl="1"/>
-            <a:r>
-              <a:rPr lang="en-US" dirty="0"/>
-              <a:t>Identify any known angular and linear velocities and accelerations (magnitude and/or direction)</a:t>
-            </a:r>
-          </a:p>
-          <a:p>
-            <a:pPr lvl="1"/>
-            <a:r>
-              <a:rPr lang="en-US" dirty="0"/>
-              <a:t>Define unknown vectors</a:t>
-            </a:r>
-          </a:p>
-          <a:p>
-            <a:r>
-              <a:rPr lang="en-US" dirty="0"/>
-              <a:t>Start stepping through from a point with known velocity/ acceleration toward the point you want to know about</a:t>
-            </a:r>
-          </a:p>
-          <a:p>
-            <a:pPr lvl="1"/>
-            <a:r>
-              <a:rPr lang="en-US" dirty="0"/>
-              <a:t>Use a series of relative motion equations OR rotating frame equations as needed, substituting into one vector equation</a:t>
-            </a:r>
-          </a:p>
-          <a:p>
-            <a:r>
-              <a:rPr lang="en-US" dirty="0"/>
-              <a:t>Use the equations you have generated, along with any current angles, distances, velocities, and accelerations to solve for the unknowns</a:t>
-            </a:r>
-          </a:p>
-          <a:p>
-            <a:pPr lvl="1"/>
-            <a:r>
-              <a:rPr lang="en-US" dirty="0"/>
-              <a:t>Create two scalar equations (x and y directions) from your vector equation to solve for up to two unknowns</a:t>
-            </a:r>
-          </a:p>
-        </p:txBody>
-      </p:sp>
+      <mc:AlternateContent xmlns:mc="http://schemas.openxmlformats.org/markup-compatibility/2006">
+        <mc:Choice xmlns:a14="http://schemas.microsoft.com/office/drawing/2010/main" Requires="a14">
+          <p:sp>
+            <p:nvSpPr>
+              <p:cNvPr id="3" name="Content Placeholder 2">
+                <a:extLst>
+                  <a:ext uri="{FF2B5EF4-FFF2-40B4-BE49-F238E27FC236}">
+                    <a16:creationId xmlns:a16="http://schemas.microsoft.com/office/drawing/2014/main" id="{21A3E3C7-5743-41B3-AD91-340BF58A1800}"/>
+                  </a:ext>
+                </a:extLst>
+              </p:cNvPr>
+              <p:cNvSpPr>
+                <a:spLocks noGrp="1"/>
+              </p:cNvSpPr>
+              <p:nvPr>
+                <p:ph idx="1"/>
+              </p:nvPr>
+            </p:nvSpPr>
+            <p:spPr>
+              <a:xfrm>
+                <a:off x="457200" y="1417638"/>
+                <a:ext cx="8229600" cy="4983162"/>
+              </a:xfrm>
+            </p:spPr>
+            <p:txBody>
+              <a:bodyPr>
+                <a:normAutofit fontScale="70000" lnSpcReduction="20000"/>
+              </a:bodyPr>
+              <a:lstStyle/>
+              <a:p>
+                <a:r>
+                  <a:rPr lang="en-US" dirty="0"/>
+                  <a:t>Start by creating a diagram of the body, with the key distances and angles labeled</a:t>
+                </a:r>
+              </a:p>
+              <a:p>
+                <a:pPr lvl="1"/>
+                <a:r>
+                  <a:rPr lang="en-US" dirty="0"/>
+                  <a:t>Be sure to add a fixed coordinate system (x and y directions)</a:t>
+                </a:r>
+              </a:p>
+              <a:p>
+                <a:pPr lvl="1"/>
+                <a:r>
+                  <a:rPr lang="en-US" dirty="0"/>
+                  <a:t>Add a rotating coordinate system (on the body that views the non-pinned body) and identify </a:t>
+                </a:r>
+                <a14:m>
+                  <m:oMath xmlns:m="http://schemas.openxmlformats.org/officeDocument/2006/math">
+                    <m:r>
+                      <a:rPr lang="en-CA" b="0" i="1" smtClean="0">
+                        <a:latin typeface="Cambria Math" panose="02040503050406030204" pitchFamily="18" charset="0"/>
+                      </a:rPr>
+                      <m:t>𝜔</m:t>
+                    </m:r>
+                  </m:oMath>
+                </a14:m>
+                <a:r>
+                  <a:rPr lang="en-US" dirty="0"/>
+                  <a:t> and </a:t>
+                </a:r>
+                <a14:m>
+                  <m:oMath xmlns:m="http://schemas.openxmlformats.org/officeDocument/2006/math">
+                    <m:r>
+                      <a:rPr lang="en-CA" b="0" i="1" smtClean="0">
+                        <a:latin typeface="Cambria Math" panose="02040503050406030204" pitchFamily="18" charset="0"/>
+                      </a:rPr>
+                      <m:t>𝛼</m:t>
+                    </m:r>
+                  </m:oMath>
+                </a14:m>
+                <a:r>
+                  <a:rPr lang="en-US" dirty="0"/>
+                  <a:t> (or </a:t>
+                </a:r>
+                <a14:m>
+                  <m:oMath xmlns:m="http://schemas.openxmlformats.org/officeDocument/2006/math">
+                    <m:r>
+                      <m:rPr>
+                        <m:sty m:val="p"/>
+                      </m:rPr>
+                      <a:rPr lang="en-CA" b="0" i="0" smtClean="0">
+                        <a:latin typeface="Cambria Math" panose="02040503050406030204" pitchFamily="18" charset="0"/>
+                      </a:rPr>
+                      <m:t>Ω</m:t>
+                    </m:r>
+                  </m:oMath>
+                </a14:m>
+                <a:r>
+                  <a:rPr lang="en-US" dirty="0"/>
+                  <a:t> and </a:t>
+                </a:r>
+                <a14:m>
+                  <m:oMath xmlns:m="http://schemas.openxmlformats.org/officeDocument/2006/math">
+                    <m:acc>
+                      <m:accPr>
+                        <m:chr m:val="̇"/>
+                        <m:ctrlPr>
+                          <a:rPr lang="en-CA" b="0" i="1" smtClean="0">
+                            <a:latin typeface="Cambria Math" panose="02040503050406030204" pitchFamily="18" charset="0"/>
+                          </a:rPr>
+                        </m:ctrlPr>
+                      </m:accPr>
+                      <m:e>
+                        <m:r>
+                          <m:rPr>
+                            <m:sty m:val="p"/>
+                          </m:rPr>
+                          <a:rPr lang="en-CA" b="0" i="0" smtClean="0">
+                            <a:latin typeface="Cambria Math" panose="02040503050406030204" pitchFamily="18" charset="0"/>
+                          </a:rPr>
+                          <m:t>Ω</m:t>
+                        </m:r>
+                      </m:e>
+                    </m:acc>
+                  </m:oMath>
+                </a14:m>
+                <a:r>
+                  <a:rPr lang="en-US" dirty="0"/>
+                  <a:t>) of the frame</a:t>
+                </a:r>
+              </a:p>
+              <a:p>
+                <a:pPr lvl="1"/>
+                <a:r>
+                  <a:rPr lang="en-US" dirty="0"/>
+                  <a:t>Identify any known angular and linear velocities and accelerations (magnitude and/or direction)</a:t>
+                </a:r>
+              </a:p>
+              <a:p>
+                <a:pPr lvl="1"/>
+                <a:r>
+                  <a:rPr lang="en-US" dirty="0"/>
+                  <a:t>Define unknown vectors</a:t>
+                </a:r>
+              </a:p>
+              <a:p>
+                <a:r>
+                  <a:rPr lang="en-US" dirty="0"/>
+                  <a:t>Start stepping through from a point with known velocity/ acceleration toward the point you want to know about</a:t>
+                </a:r>
+              </a:p>
+              <a:p>
+                <a:pPr lvl="1"/>
+                <a:r>
+                  <a:rPr lang="en-US" dirty="0"/>
+                  <a:t>Use a series of relative motion equations OR rotating frame equations as needed, substituting into one vector equation</a:t>
+                </a:r>
+              </a:p>
+              <a:p>
+                <a:r>
+                  <a:rPr lang="en-US" dirty="0"/>
+                  <a:t>Use the equations you have generated, along with any current angles, distances, velocities, and accelerations to solve for the unknowns</a:t>
+                </a:r>
+              </a:p>
+              <a:p>
+                <a:pPr lvl="1"/>
+                <a:r>
+                  <a:rPr lang="en-US" dirty="0"/>
+                  <a:t>Create two scalar equations (x and y directions) from your vector equation to solve for up to two unknowns</a:t>
+                </a:r>
+              </a:p>
+            </p:txBody>
+          </p:sp>
+        </mc:Choice>
+        <mc:Fallback>
+          <p:sp>
+            <p:nvSpPr>
+              <p:cNvPr id="3" name="Content Placeholder 2">
+                <a:extLst>
+                  <a:ext uri="{FF2B5EF4-FFF2-40B4-BE49-F238E27FC236}">
+                    <a16:creationId xmlns:a16="http://schemas.microsoft.com/office/drawing/2014/main" id="{21A3E3C7-5743-41B3-AD91-340BF58A1800}"/>
+                  </a:ext>
+                </a:extLst>
+              </p:cNvPr>
+              <p:cNvSpPr>
+                <a:spLocks noGrp="1" noRot="1" noChangeAspect="1" noMove="1" noResize="1" noEditPoints="1" noAdjustHandles="1" noChangeArrowheads="1" noChangeShapeType="1" noTextEdit="1"/>
+              </p:cNvSpPr>
+              <p:nvPr>
+                <p:ph idx="1"/>
+              </p:nvPr>
+            </p:nvSpPr>
+            <p:spPr>
+              <a:xfrm>
+                <a:off x="457200" y="1417638"/>
+                <a:ext cx="8229600" cy="4983162"/>
+              </a:xfrm>
+              <a:blipFill>
+                <a:blip r:embed="rId2"/>
+                <a:stretch>
+                  <a:fillRect l="-926" t="-2030" r="-154" b="-761"/>
+                </a:stretch>
+              </a:blipFill>
+            </p:spPr>
+            <p:txBody>
+              <a:bodyPr/>
+              <a:lstStyle/>
+              <a:p>
+                <a:r>
+                  <a:rPr lang="en-US">
+                    <a:noFill/>
+                  </a:rPr>
+                  <a:t> </a:t>
+                </a:r>
+              </a:p>
+            </p:txBody>
+          </p:sp>
+        </mc:Fallback>
+      </mc:AlternateContent>
     </p:spTree>
     <p:extLst>
       <p:ext uri="{BB962C8B-B14F-4D97-AF65-F5344CB8AC3E}">
@@ -4628,13 +4733,8 @@
           <a:p>
             <a:r>
               <a:rPr lang="en-US" dirty="0"/>
-              <a:t>Take your time with this analysis – it can </a:t>
+              <a:t>Take your time with this analysis – it can be challenging</a:t>
             </a:r>
-            <a:r>
-              <a:rPr lang="en-US"/>
-              <a:t>be challenging</a:t>
-            </a:r>
-            <a:endParaRPr lang="en-US" dirty="0"/>
           </a:p>
         </p:txBody>
       </p:sp>
@@ -17029,10 +17129,10 @@
       </p:sp>
       <p:grpSp>
         <p:nvGrpSpPr>
-          <p:cNvPr id="9" name="Group 8">
+          <p:cNvPr id="69" name="Group 68">
             <a:extLst>
               <a:ext uri="{FF2B5EF4-FFF2-40B4-BE49-F238E27FC236}">
-                <a16:creationId xmlns:a16="http://schemas.microsoft.com/office/drawing/2014/main" id="{411954A1-8C14-174E-93DC-A658D73D9F0E}"/>
+                <a16:creationId xmlns:a16="http://schemas.microsoft.com/office/drawing/2014/main" id="{0836F9CF-E58A-F148-A39A-415047AB44EA}"/>
               </a:ext>
             </a:extLst>
           </p:cNvPr>
@@ -17043,424 +17143,357 @@
           <a:xfrm rot="18271205">
             <a:off x="3544633" y="2844118"/>
             <a:ext cx="2086226" cy="1466731"/>
-            <a:chOff x="3999391" y="3193527"/>
+            <a:chOff x="5715689" y="1097461"/>
             <a:chExt cx="2086226" cy="1466731"/>
           </a:xfrm>
         </p:grpSpPr>
-        <p:grpSp>
-          <p:nvGrpSpPr>
-            <p:cNvPr id="69" name="Group 68">
+        <p:cxnSp>
+          <p:nvCxnSpPr>
+            <p:cNvPr id="70" name="Straight Arrow Connector 69">
               <a:extLst>
                 <a:ext uri="{FF2B5EF4-FFF2-40B4-BE49-F238E27FC236}">
-                  <a16:creationId xmlns:a16="http://schemas.microsoft.com/office/drawing/2014/main" id="{0836F9CF-E58A-F148-A39A-415047AB44EA}"/>
+                  <a16:creationId xmlns:a16="http://schemas.microsoft.com/office/drawing/2014/main" id="{F8358074-1780-A847-8993-5EA4A65B8BA6}"/>
                 </a:ext>
               </a:extLst>
             </p:cNvPr>
-            <p:cNvGrpSpPr/>
+            <p:cNvCxnSpPr>
+              <a:cxnSpLocks/>
+            </p:cNvCxnSpPr>
             <p:nvPr/>
-          </p:nvGrpSpPr>
-          <p:grpSpPr>
-            <a:xfrm>
-              <a:off x="3999391" y="3193527"/>
-              <a:ext cx="2086226" cy="1466731"/>
-              <a:chOff x="5715689" y="1097461"/>
-              <a:chExt cx="2086226" cy="1466731"/>
+          </p:nvCxnSpPr>
+          <p:spPr>
+            <a:xfrm flipV="1">
+              <a:off x="6168637" y="2393917"/>
+              <a:ext cx="1222763" cy="7898"/>
             </a:xfrm>
-          </p:grpSpPr>
-          <p:cxnSp>
-            <p:nvCxnSpPr>
-              <p:cNvPr id="70" name="Straight Arrow Connector 69">
-                <a:extLst>
-                  <a:ext uri="{FF2B5EF4-FFF2-40B4-BE49-F238E27FC236}">
-                    <a16:creationId xmlns:a16="http://schemas.microsoft.com/office/drawing/2014/main" id="{F8358074-1780-A847-8993-5EA4A65B8BA6}"/>
-                  </a:ext>
-                </a:extLst>
-              </p:cNvPr>
-              <p:cNvCxnSpPr>
-                <a:cxnSpLocks/>
-              </p:cNvCxnSpPr>
-              <p:nvPr/>
-            </p:nvCxnSpPr>
-            <p:spPr>
-              <a:xfrm flipV="1">
-                <a:off x="6168637" y="2393917"/>
-                <a:ext cx="1222763" cy="7898"/>
-              </a:xfrm>
-              <a:prstGeom prst="straightConnector1">
-                <a:avLst/>
-              </a:prstGeom>
-              <a:ln>
-                <a:solidFill>
-                  <a:schemeClr val="bg1">
-                    <a:lumMod val="50000"/>
-                  </a:schemeClr>
-                </a:solidFill>
-                <a:tailEnd type="arrow"/>
-              </a:ln>
-            </p:spPr>
-            <p:style>
-              <a:lnRef idx="2">
-                <a:schemeClr val="dk1"/>
-              </a:lnRef>
-              <a:fillRef idx="0">
-                <a:schemeClr val="dk1"/>
-              </a:fillRef>
-              <a:effectRef idx="1">
-                <a:schemeClr val="dk1"/>
-              </a:effectRef>
-              <a:fontRef idx="minor">
-                <a:schemeClr val="tx1"/>
-              </a:fontRef>
-            </p:style>
-          </p:cxnSp>
-          <p:cxnSp>
-            <p:nvCxnSpPr>
-              <p:cNvPr id="71" name="Straight Arrow Connector 70">
-                <a:extLst>
-                  <a:ext uri="{FF2B5EF4-FFF2-40B4-BE49-F238E27FC236}">
-                    <a16:creationId xmlns:a16="http://schemas.microsoft.com/office/drawing/2014/main" id="{D143C02B-BD46-EA4B-B443-A46477311C65}"/>
-                  </a:ext>
-                </a:extLst>
-              </p:cNvPr>
-              <p:cNvCxnSpPr>
-                <a:cxnSpLocks/>
-              </p:cNvCxnSpPr>
-              <p:nvPr/>
-            </p:nvCxnSpPr>
-            <p:spPr>
-              <a:xfrm flipV="1">
-                <a:off x="6186824" y="1258587"/>
-                <a:ext cx="0" cy="1135330"/>
-              </a:xfrm>
-              <a:prstGeom prst="straightConnector1">
-                <a:avLst/>
-              </a:prstGeom>
-              <a:ln>
-                <a:solidFill>
-                  <a:schemeClr val="bg1">
-                    <a:lumMod val="50000"/>
-                  </a:schemeClr>
-                </a:solidFill>
-                <a:tailEnd type="arrow"/>
-              </a:ln>
-            </p:spPr>
-            <p:style>
-              <a:lnRef idx="2">
-                <a:schemeClr val="dk1"/>
-              </a:lnRef>
-              <a:fillRef idx="0">
-                <a:schemeClr val="dk1"/>
-              </a:fillRef>
-              <a:effectRef idx="1">
-                <a:schemeClr val="dk1"/>
-              </a:effectRef>
-              <a:fontRef idx="minor">
-                <a:schemeClr val="tx1"/>
-              </a:fontRef>
-            </p:style>
-          </p:cxnSp>
-          <mc:AlternateContent xmlns:mc="http://schemas.openxmlformats.org/markup-compatibility/2006" xmlns:a14="http://schemas.microsoft.com/office/drawing/2010/main">
-            <mc:Choice Requires="a14">
-              <p:sp>
-                <p:nvSpPr>
-                  <p:cNvPr id="72" name="TextBox 71">
-                    <a:extLst>
-                      <a:ext uri="{FF2B5EF4-FFF2-40B4-BE49-F238E27FC236}">
-                        <a16:creationId xmlns:a16="http://schemas.microsoft.com/office/drawing/2014/main" id="{3C63461C-9146-B041-BA79-0BBCA07F4920}"/>
-                      </a:ext>
-                    </a:extLst>
-                  </p:cNvPr>
-                  <p:cNvSpPr txBox="1"/>
-                  <p:nvPr/>
-                </p:nvSpPr>
-                <p:spPr>
-                  <a:xfrm>
-                    <a:off x="5715689" y="1097461"/>
-                    <a:ext cx="549989" cy="369332"/>
-                  </a:xfrm>
-                  <a:prstGeom prst="rect">
-                    <a:avLst/>
-                  </a:prstGeom>
-                  <a:noFill/>
-                  <a:ln>
-                    <a:noFill/>
-                  </a:ln>
-                </p:spPr>
-                <p:txBody>
-                  <a:bodyPr wrap="square" rtlCol="0">
-                    <a:spAutoFit/>
-                  </a:bodyPr>
-                  <a:lstStyle/>
-                  <a:p>
-                    <a:pPr/>
-                    <a14:m>
-                      <m:oMathPara xmlns:m="http://schemas.openxmlformats.org/officeDocument/2006/math">
-                        <m:oMathParaPr>
-                          <m:jc m:val="centerGroup"/>
-                        </m:oMathParaPr>
-                        <m:oMath xmlns:m="http://schemas.openxmlformats.org/officeDocument/2006/math">
-                          <m:r>
-                            <a:rPr lang="en-CA" b="0" i="1" smtClean="0">
-                              <a:solidFill>
-                                <a:schemeClr val="bg1">
-                                  <a:lumMod val="50000"/>
-                                </a:schemeClr>
-                              </a:solidFill>
-                              <a:latin typeface="Cambria Math" panose="02040503050406030204" pitchFamily="18" charset="0"/>
-                            </a:rPr>
-                            <m:t>𝑦</m:t>
-                          </m:r>
-                          <m:r>
-                            <a:rPr lang="en-CA" b="0" i="1" smtClean="0">
-                              <a:solidFill>
-                                <a:schemeClr val="bg1">
-                                  <a:lumMod val="50000"/>
-                                </a:schemeClr>
-                              </a:solidFill>
-                              <a:latin typeface="Cambria Math" panose="02040503050406030204" pitchFamily="18" charset="0"/>
-                            </a:rPr>
-                            <m:t>′</m:t>
-                          </m:r>
-                        </m:oMath>
-                      </m:oMathPara>
-                    </a14:m>
-                    <a:endParaRPr lang="en-US" dirty="0">
-                      <a:solidFill>
-                        <a:schemeClr val="bg1">
-                          <a:lumMod val="50000"/>
-                        </a:schemeClr>
-                      </a:solidFill>
-                    </a:endParaRPr>
-                  </a:p>
-                </p:txBody>
-              </p:sp>
-            </mc:Choice>
-            <mc:Fallback xmlns="">
-              <p:sp>
-                <p:nvSpPr>
-                  <p:cNvPr id="72" name="TextBox 71">
-                    <a:extLst>
-                      <a:ext uri="{FF2B5EF4-FFF2-40B4-BE49-F238E27FC236}">
-                        <a16:creationId xmlns:a16="http://schemas.microsoft.com/office/drawing/2014/main" id="{3C63461C-9146-B041-BA79-0BBCA07F4920}"/>
-                      </a:ext>
-                    </a:extLst>
-                  </p:cNvPr>
-                  <p:cNvSpPr txBox="1">
-                    <a:spLocks noRot="1" noChangeAspect="1" noMove="1" noResize="1" noEditPoints="1" noAdjustHandles="1" noChangeArrowheads="1" noChangeShapeType="1" noTextEdit="1"/>
-                  </p:cNvSpPr>
-                  <p:nvPr/>
-                </p:nvSpPr>
-                <p:spPr>
-                  <a:xfrm>
-                    <a:off x="5715689" y="1097461"/>
-                    <a:ext cx="549989" cy="369332"/>
-                  </a:xfrm>
-                  <a:prstGeom prst="rect">
-                    <a:avLst/>
-                  </a:prstGeom>
-                  <a:blipFill>
-                    <a:blip r:embed="rId13"/>
-                    <a:stretch>
-                      <a:fillRect r="-2000"/>
-                    </a:stretch>
-                  </a:blipFill>
-                  <a:ln>
-                    <a:noFill/>
-                  </a:ln>
-                </p:spPr>
-                <p:txBody>
-                  <a:bodyPr/>
-                  <a:lstStyle/>
-                  <a:p>
-                    <a:r>
-                      <a:rPr lang="en-US">
-                        <a:noFill/>
-                      </a:rPr>
-                      <a:t> </a:t>
-                    </a:r>
-                  </a:p>
-                </p:txBody>
-              </p:sp>
-            </mc:Fallback>
-          </mc:AlternateContent>
-          <mc:AlternateContent xmlns:mc="http://schemas.openxmlformats.org/markup-compatibility/2006" xmlns:a14="http://schemas.microsoft.com/office/drawing/2010/main">
-            <mc:Choice Requires="a14">
-              <p:sp>
-                <p:nvSpPr>
-                  <p:cNvPr id="73" name="TextBox 72">
-                    <a:extLst>
-                      <a:ext uri="{FF2B5EF4-FFF2-40B4-BE49-F238E27FC236}">
-                        <a16:creationId xmlns:a16="http://schemas.microsoft.com/office/drawing/2014/main" id="{0FFE0293-CF4F-724C-9C19-65899E6A332C}"/>
-                      </a:ext>
-                    </a:extLst>
-                  </p:cNvPr>
-                  <p:cNvSpPr txBox="1"/>
-                  <p:nvPr/>
-                </p:nvSpPr>
-                <p:spPr>
-                  <a:xfrm>
-                    <a:off x="7261084" y="2194860"/>
-                    <a:ext cx="540831" cy="369332"/>
-                  </a:xfrm>
-                  <a:prstGeom prst="rect">
-                    <a:avLst/>
-                  </a:prstGeom>
-                  <a:noFill/>
-                  <a:ln>
-                    <a:noFill/>
-                  </a:ln>
-                </p:spPr>
-                <p:txBody>
-                  <a:bodyPr wrap="square" rtlCol="0">
-                    <a:spAutoFit/>
-                  </a:bodyPr>
-                  <a:lstStyle/>
-                  <a:p>
-                    <a:pPr/>
-                    <a14:m>
-                      <m:oMathPara xmlns:m="http://schemas.openxmlformats.org/officeDocument/2006/math">
-                        <m:oMathParaPr>
-                          <m:jc m:val="centerGroup"/>
-                        </m:oMathParaPr>
-                        <m:oMath xmlns:m="http://schemas.openxmlformats.org/officeDocument/2006/math">
-                          <m:r>
-                            <a:rPr lang="en-CA" b="0" i="1" smtClean="0">
-                              <a:solidFill>
-                                <a:schemeClr val="bg1">
-                                  <a:lumMod val="50000"/>
-                                </a:schemeClr>
-                              </a:solidFill>
-                              <a:latin typeface="Cambria Math" panose="02040503050406030204" pitchFamily="18" charset="0"/>
-                            </a:rPr>
-                            <m:t>𝑥</m:t>
-                          </m:r>
-                          <m:r>
-                            <a:rPr lang="en-CA" b="0" i="1" smtClean="0">
-                              <a:solidFill>
-                                <a:schemeClr val="bg1">
-                                  <a:lumMod val="50000"/>
-                                </a:schemeClr>
-                              </a:solidFill>
-                              <a:latin typeface="Cambria Math" panose="02040503050406030204" pitchFamily="18" charset="0"/>
-                            </a:rPr>
-                            <m:t>′</m:t>
-                          </m:r>
-                        </m:oMath>
-                      </m:oMathPara>
-                    </a14:m>
-                    <a:endParaRPr lang="en-US" dirty="0">
-                      <a:solidFill>
-                        <a:schemeClr val="bg1">
-                          <a:lumMod val="50000"/>
-                        </a:schemeClr>
-                      </a:solidFill>
-                    </a:endParaRPr>
-                  </a:p>
-                </p:txBody>
-              </p:sp>
-            </mc:Choice>
-            <mc:Fallback xmlns="">
-              <p:sp>
-                <p:nvSpPr>
-                  <p:cNvPr id="73" name="TextBox 72">
-                    <a:extLst>
-                      <a:ext uri="{FF2B5EF4-FFF2-40B4-BE49-F238E27FC236}">
-                        <a16:creationId xmlns:a16="http://schemas.microsoft.com/office/drawing/2014/main" id="{0FFE0293-CF4F-724C-9C19-65899E6A332C}"/>
-                      </a:ext>
-                    </a:extLst>
-                  </p:cNvPr>
-                  <p:cNvSpPr txBox="1">
-                    <a:spLocks noRot="1" noChangeAspect="1" noMove="1" noResize="1" noEditPoints="1" noAdjustHandles="1" noChangeArrowheads="1" noChangeShapeType="1" noTextEdit="1"/>
-                  </p:cNvSpPr>
-                  <p:nvPr/>
-                </p:nvSpPr>
-                <p:spPr>
-                  <a:xfrm>
-                    <a:off x="7261084" y="2194860"/>
-                    <a:ext cx="540831" cy="369332"/>
-                  </a:xfrm>
-                  <a:prstGeom prst="rect">
-                    <a:avLst/>
-                  </a:prstGeom>
-                  <a:blipFill>
-                    <a:blip r:embed="rId14"/>
-                    <a:stretch>
-                      <a:fillRect/>
-                    </a:stretch>
-                  </a:blipFill>
-                  <a:ln>
-                    <a:noFill/>
-                  </a:ln>
-                </p:spPr>
-                <p:txBody>
-                  <a:bodyPr/>
-                  <a:lstStyle/>
-                  <a:p>
-                    <a:r>
-                      <a:rPr lang="en-US">
-                        <a:noFill/>
-                      </a:rPr>
-                      <a:t> </a:t>
-                    </a:r>
-                  </a:p>
-                </p:txBody>
-              </p:sp>
-            </mc:Fallback>
-          </mc:AlternateContent>
-        </p:grpSp>
-        <p:pic>
-          <p:nvPicPr>
-            <p:cNvPr id="74" name="Picture 73">
+            <a:prstGeom prst="straightConnector1">
+              <a:avLst/>
+            </a:prstGeom>
+            <a:ln>
+              <a:solidFill>
+                <a:schemeClr val="bg1">
+                  <a:lumMod val="50000"/>
+                </a:schemeClr>
+              </a:solidFill>
+              <a:tailEnd type="arrow"/>
+            </a:ln>
+          </p:spPr>
+          <p:style>
+            <a:lnRef idx="2">
+              <a:schemeClr val="dk1"/>
+            </a:lnRef>
+            <a:fillRef idx="0">
+              <a:schemeClr val="dk1"/>
+            </a:fillRef>
+            <a:effectRef idx="1">
+              <a:schemeClr val="dk1"/>
+            </a:effectRef>
+            <a:fontRef idx="minor">
+              <a:schemeClr val="tx1"/>
+            </a:fontRef>
+          </p:style>
+        </p:cxnSp>
+        <p:cxnSp>
+          <p:nvCxnSpPr>
+            <p:cNvPr id="71" name="Straight Arrow Connector 70">
               <a:extLst>
                 <a:ext uri="{FF2B5EF4-FFF2-40B4-BE49-F238E27FC236}">
-                  <a16:creationId xmlns:a16="http://schemas.microsoft.com/office/drawing/2014/main" id="{E10A8462-8056-0F4B-B6A3-013125368DB8}"/>
+                  <a16:creationId xmlns:a16="http://schemas.microsoft.com/office/drawing/2014/main" id="{D143C02B-BD46-EA4B-B443-A46477311C65}"/>
                 </a:ext>
               </a:extLst>
             </p:cNvPr>
-            <p:cNvPicPr>
-              <a:picLocks noChangeAspect="1"/>
-            </p:cNvPicPr>
+            <p:cNvCxnSpPr>
+              <a:cxnSpLocks/>
+            </p:cNvCxnSpPr>
             <p:nvPr/>
-          </p:nvPicPr>
-          <p:blipFill>
-            <a:blip r:embed="rId15">
-              <a:duotone>
-                <a:schemeClr val="bg2">
-                  <a:shade val="45000"/>
-                  <a:satMod val="135000"/>
-                </a:schemeClr>
-                <a:prstClr val="white"/>
-              </a:duotone>
-              <a:extLst>
-                <a:ext uri="{28A0092B-C50C-407E-A947-70E740481C1C}">
-                  <a14:useLocalDpi xmlns:a14="http://schemas.microsoft.com/office/drawing/2010/main" val="0"/>
-                </a:ext>
-              </a:extLst>
-            </a:blip>
-            <a:stretch>
-              <a:fillRect/>
-            </a:stretch>
-          </p:blipFill>
+          </p:nvCxnSpPr>
           <p:spPr>
-            <a:xfrm flipH="1">
-              <a:off x="4338740" y="3868918"/>
-              <a:ext cx="731312" cy="664027"/>
+            <a:xfrm flipV="1">
+              <a:off x="6186824" y="1258587"/>
+              <a:ext cx="0" cy="1135330"/>
             </a:xfrm>
-            <a:prstGeom prst="rect">
+            <a:prstGeom prst="straightConnector1">
               <a:avLst/>
             </a:prstGeom>
             <a:ln>
-              <a:noFill/>
+              <a:solidFill>
+                <a:schemeClr val="bg1">
+                  <a:lumMod val="50000"/>
+                </a:schemeClr>
+              </a:solidFill>
+              <a:tailEnd type="arrow"/>
             </a:ln>
           </p:spPr>
-        </p:pic>
+          <p:style>
+            <a:lnRef idx="2">
+              <a:schemeClr val="dk1"/>
+            </a:lnRef>
+            <a:fillRef idx="0">
+              <a:schemeClr val="dk1"/>
+            </a:fillRef>
+            <a:effectRef idx="1">
+              <a:schemeClr val="dk1"/>
+            </a:effectRef>
+            <a:fontRef idx="minor">
+              <a:schemeClr val="tx1"/>
+            </a:fontRef>
+          </p:style>
+        </p:cxnSp>
+        <mc:AlternateContent xmlns:mc="http://schemas.openxmlformats.org/markup-compatibility/2006" xmlns:a14="http://schemas.microsoft.com/office/drawing/2010/main">
+          <mc:Choice Requires="a14">
+            <p:sp>
+              <p:nvSpPr>
+                <p:cNvPr id="72" name="TextBox 71">
+                  <a:extLst>
+                    <a:ext uri="{FF2B5EF4-FFF2-40B4-BE49-F238E27FC236}">
+                      <a16:creationId xmlns:a16="http://schemas.microsoft.com/office/drawing/2014/main" id="{3C63461C-9146-B041-BA79-0BBCA07F4920}"/>
+                    </a:ext>
+                  </a:extLst>
+                </p:cNvPr>
+                <p:cNvSpPr txBox="1"/>
+                <p:nvPr/>
+              </p:nvSpPr>
+              <p:spPr>
+                <a:xfrm>
+                  <a:off x="5715689" y="1097461"/>
+                  <a:ext cx="549989" cy="369332"/>
+                </a:xfrm>
+                <a:prstGeom prst="rect">
+                  <a:avLst/>
+                </a:prstGeom>
+                <a:noFill/>
+                <a:ln>
+                  <a:noFill/>
+                </a:ln>
+              </p:spPr>
+              <p:txBody>
+                <a:bodyPr wrap="square" rtlCol="0">
+                  <a:spAutoFit/>
+                </a:bodyPr>
+                <a:lstStyle/>
+                <a:p>
+                  <a:pPr/>
+                  <a14:m>
+                    <m:oMathPara xmlns:m="http://schemas.openxmlformats.org/officeDocument/2006/math">
+                      <m:oMathParaPr>
+                        <m:jc m:val="centerGroup"/>
+                      </m:oMathParaPr>
+                      <m:oMath xmlns:m="http://schemas.openxmlformats.org/officeDocument/2006/math">
+                        <m:r>
+                          <a:rPr lang="en-CA" b="0" i="1" smtClean="0">
+                            <a:solidFill>
+                              <a:schemeClr val="bg1">
+                                <a:lumMod val="50000"/>
+                              </a:schemeClr>
+                            </a:solidFill>
+                            <a:latin typeface="Cambria Math" panose="02040503050406030204" pitchFamily="18" charset="0"/>
+                          </a:rPr>
+                          <m:t>𝑦</m:t>
+                        </m:r>
+                        <m:r>
+                          <a:rPr lang="en-CA" b="0" i="1" smtClean="0">
+                            <a:solidFill>
+                              <a:schemeClr val="bg1">
+                                <a:lumMod val="50000"/>
+                              </a:schemeClr>
+                            </a:solidFill>
+                            <a:latin typeface="Cambria Math" panose="02040503050406030204" pitchFamily="18" charset="0"/>
+                          </a:rPr>
+                          <m:t>′</m:t>
+                        </m:r>
+                      </m:oMath>
+                    </m:oMathPara>
+                  </a14:m>
+                  <a:endParaRPr lang="en-US" dirty="0">
+                    <a:solidFill>
+                      <a:schemeClr val="bg1">
+                        <a:lumMod val="50000"/>
+                      </a:schemeClr>
+                    </a:solidFill>
+                  </a:endParaRPr>
+                </a:p>
+              </p:txBody>
+            </p:sp>
+          </mc:Choice>
+          <mc:Fallback xmlns="">
+            <p:sp>
+              <p:nvSpPr>
+                <p:cNvPr id="72" name="TextBox 71">
+                  <a:extLst>
+                    <a:ext uri="{FF2B5EF4-FFF2-40B4-BE49-F238E27FC236}">
+                      <a16:creationId xmlns:a16="http://schemas.microsoft.com/office/drawing/2014/main" id="{3C63461C-9146-B041-BA79-0BBCA07F4920}"/>
+                    </a:ext>
+                  </a:extLst>
+                </p:cNvPr>
+                <p:cNvSpPr txBox="1">
+                  <a:spLocks noRot="1" noChangeAspect="1" noMove="1" noResize="1" noEditPoints="1" noAdjustHandles="1" noChangeArrowheads="1" noChangeShapeType="1" noTextEdit="1"/>
+                </p:cNvSpPr>
+                <p:nvPr/>
+              </p:nvSpPr>
+              <p:spPr>
+                <a:xfrm>
+                  <a:off x="5715689" y="1097461"/>
+                  <a:ext cx="549989" cy="369332"/>
+                </a:xfrm>
+                <a:prstGeom prst="rect">
+                  <a:avLst/>
+                </a:prstGeom>
+                <a:blipFill>
+                  <a:blip r:embed="rId13"/>
+                  <a:stretch>
+                    <a:fillRect r="-2000"/>
+                  </a:stretch>
+                </a:blipFill>
+                <a:ln>
+                  <a:noFill/>
+                </a:ln>
+              </p:spPr>
+              <p:txBody>
+                <a:bodyPr/>
+                <a:lstStyle/>
+                <a:p>
+                  <a:r>
+                    <a:rPr lang="en-US">
+                      <a:noFill/>
+                    </a:rPr>
+                    <a:t> </a:t>
+                  </a:r>
+                </a:p>
+              </p:txBody>
+            </p:sp>
+          </mc:Fallback>
+        </mc:AlternateContent>
+        <mc:AlternateContent xmlns:mc="http://schemas.openxmlformats.org/markup-compatibility/2006" xmlns:a14="http://schemas.microsoft.com/office/drawing/2010/main">
+          <mc:Choice Requires="a14">
+            <p:sp>
+              <p:nvSpPr>
+                <p:cNvPr id="73" name="TextBox 72">
+                  <a:extLst>
+                    <a:ext uri="{FF2B5EF4-FFF2-40B4-BE49-F238E27FC236}">
+                      <a16:creationId xmlns:a16="http://schemas.microsoft.com/office/drawing/2014/main" id="{0FFE0293-CF4F-724C-9C19-65899E6A332C}"/>
+                    </a:ext>
+                  </a:extLst>
+                </p:cNvPr>
+                <p:cNvSpPr txBox="1"/>
+                <p:nvPr/>
+              </p:nvSpPr>
+              <p:spPr>
+                <a:xfrm>
+                  <a:off x="7261084" y="2194860"/>
+                  <a:ext cx="540831" cy="369332"/>
+                </a:xfrm>
+                <a:prstGeom prst="rect">
+                  <a:avLst/>
+                </a:prstGeom>
+                <a:noFill/>
+                <a:ln>
+                  <a:noFill/>
+                </a:ln>
+              </p:spPr>
+              <p:txBody>
+                <a:bodyPr wrap="square" rtlCol="0">
+                  <a:spAutoFit/>
+                </a:bodyPr>
+                <a:lstStyle/>
+                <a:p>
+                  <a:pPr/>
+                  <a14:m>
+                    <m:oMathPara xmlns:m="http://schemas.openxmlformats.org/officeDocument/2006/math">
+                      <m:oMathParaPr>
+                        <m:jc m:val="centerGroup"/>
+                      </m:oMathParaPr>
+                      <m:oMath xmlns:m="http://schemas.openxmlformats.org/officeDocument/2006/math">
+                        <m:r>
+                          <a:rPr lang="en-CA" b="0" i="1" smtClean="0">
+                            <a:solidFill>
+                              <a:schemeClr val="bg1">
+                                <a:lumMod val="50000"/>
+                              </a:schemeClr>
+                            </a:solidFill>
+                            <a:latin typeface="Cambria Math" panose="02040503050406030204" pitchFamily="18" charset="0"/>
+                          </a:rPr>
+                          <m:t>𝑥</m:t>
+                        </m:r>
+                        <m:r>
+                          <a:rPr lang="en-CA" b="0" i="1" smtClean="0">
+                            <a:solidFill>
+                              <a:schemeClr val="bg1">
+                                <a:lumMod val="50000"/>
+                              </a:schemeClr>
+                            </a:solidFill>
+                            <a:latin typeface="Cambria Math" panose="02040503050406030204" pitchFamily="18" charset="0"/>
+                          </a:rPr>
+                          <m:t>′</m:t>
+                        </m:r>
+                      </m:oMath>
+                    </m:oMathPara>
+                  </a14:m>
+                  <a:endParaRPr lang="en-US" dirty="0">
+                    <a:solidFill>
+                      <a:schemeClr val="bg1">
+                        <a:lumMod val="50000"/>
+                      </a:schemeClr>
+                    </a:solidFill>
+                  </a:endParaRPr>
+                </a:p>
+              </p:txBody>
+            </p:sp>
+          </mc:Choice>
+          <mc:Fallback xmlns="">
+            <p:sp>
+              <p:nvSpPr>
+                <p:cNvPr id="73" name="TextBox 72">
+                  <a:extLst>
+                    <a:ext uri="{FF2B5EF4-FFF2-40B4-BE49-F238E27FC236}">
+                      <a16:creationId xmlns:a16="http://schemas.microsoft.com/office/drawing/2014/main" id="{0FFE0293-CF4F-724C-9C19-65899E6A332C}"/>
+                    </a:ext>
+                  </a:extLst>
+                </p:cNvPr>
+                <p:cNvSpPr txBox="1">
+                  <a:spLocks noRot="1" noChangeAspect="1" noMove="1" noResize="1" noEditPoints="1" noAdjustHandles="1" noChangeArrowheads="1" noChangeShapeType="1" noTextEdit="1"/>
+                </p:cNvSpPr>
+                <p:nvPr/>
+              </p:nvSpPr>
+              <p:spPr>
+                <a:xfrm>
+                  <a:off x="7261084" y="2194860"/>
+                  <a:ext cx="540831" cy="369332"/>
+                </a:xfrm>
+                <a:prstGeom prst="rect">
+                  <a:avLst/>
+                </a:prstGeom>
+                <a:blipFill>
+                  <a:blip r:embed="rId14"/>
+                  <a:stretch>
+                    <a:fillRect/>
+                  </a:stretch>
+                </a:blipFill>
+                <a:ln>
+                  <a:noFill/>
+                </a:ln>
+              </p:spPr>
+              <p:txBody>
+                <a:bodyPr/>
+                <a:lstStyle/>
+                <a:p>
+                  <a:r>
+                    <a:rPr lang="en-US">
+                      <a:noFill/>
+                    </a:rPr>
+                    <a:t> </a:t>
+                  </a:r>
+                </a:p>
+              </p:txBody>
+            </p:sp>
+          </mc:Fallback>
+        </mc:AlternateContent>
       </p:grpSp>
       <p:grpSp>
         <p:nvGrpSpPr>
-          <p:cNvPr id="75" name="Group 74">
+          <p:cNvPr id="76" name="Group 75">
             <a:extLst>
               <a:ext uri="{FF2B5EF4-FFF2-40B4-BE49-F238E27FC236}">
-                <a16:creationId xmlns:a16="http://schemas.microsoft.com/office/drawing/2014/main" id="{8148040A-B69D-9C48-9988-C4B5D4C24973}"/>
+                <a16:creationId xmlns:a16="http://schemas.microsoft.com/office/drawing/2014/main" id="{C6F99AFC-09A0-F644-BBF0-7D6C17A9AC09}"/>
               </a:ext>
             </a:extLst>
           </p:cNvPr>
@@ -17471,417 +17504,350 @@
           <a:xfrm rot="19244621">
             <a:off x="4675222" y="2449247"/>
             <a:ext cx="2086226" cy="1466731"/>
-            <a:chOff x="3999391" y="3193527"/>
+            <a:chOff x="5715689" y="1097461"/>
             <a:chExt cx="2086226" cy="1466731"/>
           </a:xfrm>
         </p:grpSpPr>
-        <p:grpSp>
-          <p:nvGrpSpPr>
-            <p:cNvPr id="76" name="Group 75">
+        <p:cxnSp>
+          <p:nvCxnSpPr>
+            <p:cNvPr id="78" name="Straight Arrow Connector 77">
               <a:extLst>
                 <a:ext uri="{FF2B5EF4-FFF2-40B4-BE49-F238E27FC236}">
-                  <a16:creationId xmlns:a16="http://schemas.microsoft.com/office/drawing/2014/main" id="{C6F99AFC-09A0-F644-BBF0-7D6C17A9AC09}"/>
+                  <a16:creationId xmlns:a16="http://schemas.microsoft.com/office/drawing/2014/main" id="{388136DD-CCB4-644D-B6CB-A3E22020840E}"/>
                 </a:ext>
               </a:extLst>
             </p:cNvPr>
-            <p:cNvGrpSpPr/>
+            <p:cNvCxnSpPr>
+              <a:cxnSpLocks/>
+            </p:cNvCxnSpPr>
             <p:nvPr/>
-          </p:nvGrpSpPr>
-          <p:grpSpPr>
-            <a:xfrm>
-              <a:off x="3999391" y="3193527"/>
-              <a:ext cx="2086226" cy="1466731"/>
-              <a:chOff x="5715689" y="1097461"/>
-              <a:chExt cx="2086226" cy="1466731"/>
+          </p:nvCxnSpPr>
+          <p:spPr>
+            <a:xfrm flipV="1">
+              <a:off x="6168637" y="2393917"/>
+              <a:ext cx="1222763" cy="7898"/>
             </a:xfrm>
-          </p:grpSpPr>
-          <p:cxnSp>
-            <p:nvCxnSpPr>
-              <p:cNvPr id="78" name="Straight Arrow Connector 77">
-                <a:extLst>
-                  <a:ext uri="{FF2B5EF4-FFF2-40B4-BE49-F238E27FC236}">
-                    <a16:creationId xmlns:a16="http://schemas.microsoft.com/office/drawing/2014/main" id="{388136DD-CCB4-644D-B6CB-A3E22020840E}"/>
-                  </a:ext>
-                </a:extLst>
-              </p:cNvPr>
-              <p:cNvCxnSpPr>
-                <a:cxnSpLocks/>
-              </p:cNvCxnSpPr>
-              <p:nvPr/>
-            </p:nvCxnSpPr>
-            <p:spPr>
-              <a:xfrm flipV="1">
-                <a:off x="6168637" y="2393917"/>
-                <a:ext cx="1222763" cy="7898"/>
-              </a:xfrm>
-              <a:prstGeom prst="straightConnector1">
-                <a:avLst/>
-              </a:prstGeom>
-              <a:ln>
-                <a:solidFill>
-                  <a:schemeClr val="bg1">
-                    <a:lumMod val="50000"/>
-                  </a:schemeClr>
-                </a:solidFill>
-                <a:tailEnd type="arrow"/>
-              </a:ln>
-            </p:spPr>
-            <p:style>
-              <a:lnRef idx="2">
-                <a:schemeClr val="dk1"/>
-              </a:lnRef>
-              <a:fillRef idx="0">
-                <a:schemeClr val="dk1"/>
-              </a:fillRef>
-              <a:effectRef idx="1">
-                <a:schemeClr val="dk1"/>
-              </a:effectRef>
-              <a:fontRef idx="minor">
-                <a:schemeClr val="tx1"/>
-              </a:fontRef>
-            </p:style>
-          </p:cxnSp>
-          <p:cxnSp>
-            <p:nvCxnSpPr>
-              <p:cNvPr id="79" name="Straight Arrow Connector 78">
-                <a:extLst>
-                  <a:ext uri="{FF2B5EF4-FFF2-40B4-BE49-F238E27FC236}">
-                    <a16:creationId xmlns:a16="http://schemas.microsoft.com/office/drawing/2014/main" id="{449EC965-62A0-9B4D-8850-C482FA0505A6}"/>
-                  </a:ext>
-                </a:extLst>
-              </p:cNvPr>
-              <p:cNvCxnSpPr>
-                <a:cxnSpLocks/>
-              </p:cNvCxnSpPr>
-              <p:nvPr/>
-            </p:nvCxnSpPr>
-            <p:spPr>
-              <a:xfrm flipV="1">
-                <a:off x="6186824" y="1258587"/>
-                <a:ext cx="0" cy="1135330"/>
-              </a:xfrm>
-              <a:prstGeom prst="straightConnector1">
-                <a:avLst/>
-              </a:prstGeom>
-              <a:ln>
-                <a:solidFill>
-                  <a:schemeClr val="bg1">
-                    <a:lumMod val="50000"/>
-                  </a:schemeClr>
-                </a:solidFill>
-                <a:tailEnd type="arrow"/>
-              </a:ln>
-            </p:spPr>
-            <p:style>
-              <a:lnRef idx="2">
-                <a:schemeClr val="dk1"/>
-              </a:lnRef>
-              <a:fillRef idx="0">
-                <a:schemeClr val="dk1"/>
-              </a:fillRef>
-              <a:effectRef idx="1">
-                <a:schemeClr val="dk1"/>
-              </a:effectRef>
-              <a:fontRef idx="minor">
-                <a:schemeClr val="tx1"/>
-              </a:fontRef>
-            </p:style>
-          </p:cxnSp>
-          <mc:AlternateContent xmlns:mc="http://schemas.openxmlformats.org/markup-compatibility/2006" xmlns:a14="http://schemas.microsoft.com/office/drawing/2010/main">
-            <mc:Choice Requires="a14">
-              <p:sp>
-                <p:nvSpPr>
-                  <p:cNvPr id="80" name="TextBox 79">
-                    <a:extLst>
-                      <a:ext uri="{FF2B5EF4-FFF2-40B4-BE49-F238E27FC236}">
-                        <a16:creationId xmlns:a16="http://schemas.microsoft.com/office/drawing/2014/main" id="{52641E6B-8B99-234C-836A-512D5F8708DC}"/>
-                      </a:ext>
-                    </a:extLst>
-                  </p:cNvPr>
-                  <p:cNvSpPr txBox="1"/>
-                  <p:nvPr/>
-                </p:nvSpPr>
-                <p:spPr>
-                  <a:xfrm>
-                    <a:off x="5715689" y="1097461"/>
-                    <a:ext cx="549989" cy="369332"/>
-                  </a:xfrm>
-                  <a:prstGeom prst="rect">
-                    <a:avLst/>
-                  </a:prstGeom>
-                  <a:noFill/>
-                  <a:ln>
-                    <a:noFill/>
-                  </a:ln>
-                </p:spPr>
-                <p:txBody>
-                  <a:bodyPr wrap="square" rtlCol="0">
-                    <a:spAutoFit/>
-                  </a:bodyPr>
-                  <a:lstStyle/>
-                  <a:p>
-                    <a:pPr/>
-                    <a14:m>
-                      <m:oMathPara xmlns:m="http://schemas.openxmlformats.org/officeDocument/2006/math">
-                        <m:oMathParaPr>
-                          <m:jc m:val="centerGroup"/>
-                        </m:oMathParaPr>
-                        <m:oMath xmlns:m="http://schemas.openxmlformats.org/officeDocument/2006/math">
-                          <m:r>
-                            <a:rPr lang="en-CA" b="0" i="1" smtClean="0">
-                              <a:solidFill>
-                                <a:schemeClr val="bg1">
-                                  <a:lumMod val="50000"/>
-                                </a:schemeClr>
-                              </a:solidFill>
-                              <a:latin typeface="Cambria Math" panose="02040503050406030204" pitchFamily="18" charset="0"/>
-                            </a:rPr>
-                            <m:t>𝑦</m:t>
-                          </m:r>
-                          <m:r>
-                            <a:rPr lang="en-CA" b="0" i="1" smtClean="0">
-                              <a:solidFill>
-                                <a:schemeClr val="bg1">
-                                  <a:lumMod val="50000"/>
-                                </a:schemeClr>
-                              </a:solidFill>
-                              <a:latin typeface="Cambria Math" panose="02040503050406030204" pitchFamily="18" charset="0"/>
-                            </a:rPr>
-                            <m:t>′</m:t>
-                          </m:r>
-                        </m:oMath>
-                      </m:oMathPara>
-                    </a14:m>
-                    <a:endParaRPr lang="en-US" dirty="0">
-                      <a:solidFill>
-                        <a:schemeClr val="bg1">
-                          <a:lumMod val="50000"/>
-                        </a:schemeClr>
-                      </a:solidFill>
-                    </a:endParaRPr>
-                  </a:p>
-                </p:txBody>
-              </p:sp>
-            </mc:Choice>
-            <mc:Fallback xmlns="">
-              <p:sp>
-                <p:nvSpPr>
-                  <p:cNvPr id="80" name="TextBox 79">
-                    <a:extLst>
-                      <a:ext uri="{FF2B5EF4-FFF2-40B4-BE49-F238E27FC236}">
-                        <a16:creationId xmlns:a16="http://schemas.microsoft.com/office/drawing/2014/main" id="{52641E6B-8B99-234C-836A-512D5F8708DC}"/>
-                      </a:ext>
-                    </a:extLst>
-                  </p:cNvPr>
-                  <p:cNvSpPr txBox="1">
-                    <a:spLocks noRot="1" noChangeAspect="1" noMove="1" noResize="1" noEditPoints="1" noAdjustHandles="1" noChangeArrowheads="1" noChangeShapeType="1" noTextEdit="1"/>
-                  </p:cNvSpPr>
-                  <p:nvPr/>
-                </p:nvSpPr>
-                <p:spPr>
-                  <a:xfrm>
-                    <a:off x="5715689" y="1097461"/>
-                    <a:ext cx="549989" cy="369332"/>
-                  </a:xfrm>
-                  <a:prstGeom prst="rect">
-                    <a:avLst/>
-                  </a:prstGeom>
-                  <a:blipFill>
-                    <a:blip r:embed="rId16"/>
-                    <a:stretch>
-                      <a:fillRect/>
-                    </a:stretch>
-                  </a:blipFill>
-                  <a:ln>
-                    <a:noFill/>
-                  </a:ln>
-                </p:spPr>
-                <p:txBody>
-                  <a:bodyPr/>
-                  <a:lstStyle/>
-                  <a:p>
-                    <a:r>
-                      <a:rPr lang="en-US">
-                        <a:noFill/>
-                      </a:rPr>
-                      <a:t> </a:t>
-                    </a:r>
-                  </a:p>
-                </p:txBody>
-              </p:sp>
-            </mc:Fallback>
-          </mc:AlternateContent>
-          <mc:AlternateContent xmlns:mc="http://schemas.openxmlformats.org/markup-compatibility/2006" xmlns:a14="http://schemas.microsoft.com/office/drawing/2010/main">
-            <mc:Choice Requires="a14">
-              <p:sp>
-                <p:nvSpPr>
-                  <p:cNvPr id="81" name="TextBox 80">
-                    <a:extLst>
-                      <a:ext uri="{FF2B5EF4-FFF2-40B4-BE49-F238E27FC236}">
-                        <a16:creationId xmlns:a16="http://schemas.microsoft.com/office/drawing/2014/main" id="{BCDBAB5A-DD10-9749-B0A0-AE4927869399}"/>
-                      </a:ext>
-                    </a:extLst>
-                  </p:cNvPr>
-                  <p:cNvSpPr txBox="1"/>
-                  <p:nvPr/>
-                </p:nvSpPr>
-                <p:spPr>
-                  <a:xfrm>
-                    <a:off x="7261084" y="2194860"/>
-                    <a:ext cx="540831" cy="369332"/>
-                  </a:xfrm>
-                  <a:prstGeom prst="rect">
-                    <a:avLst/>
-                  </a:prstGeom>
-                  <a:noFill/>
-                  <a:ln>
-                    <a:noFill/>
-                  </a:ln>
-                </p:spPr>
-                <p:txBody>
-                  <a:bodyPr wrap="square" rtlCol="0">
-                    <a:spAutoFit/>
-                  </a:bodyPr>
-                  <a:lstStyle/>
-                  <a:p>
-                    <a:pPr/>
-                    <a14:m>
-                      <m:oMathPara xmlns:m="http://schemas.openxmlformats.org/officeDocument/2006/math">
-                        <m:oMathParaPr>
-                          <m:jc m:val="centerGroup"/>
-                        </m:oMathParaPr>
-                        <m:oMath xmlns:m="http://schemas.openxmlformats.org/officeDocument/2006/math">
-                          <m:r>
-                            <a:rPr lang="en-CA" b="0" i="1" smtClean="0">
-                              <a:solidFill>
-                                <a:schemeClr val="bg1">
-                                  <a:lumMod val="50000"/>
-                                </a:schemeClr>
-                              </a:solidFill>
-                              <a:latin typeface="Cambria Math" panose="02040503050406030204" pitchFamily="18" charset="0"/>
-                            </a:rPr>
-                            <m:t>𝑥</m:t>
-                          </m:r>
-                          <m:r>
-                            <a:rPr lang="en-CA" b="0" i="1" smtClean="0">
-                              <a:solidFill>
-                                <a:schemeClr val="bg1">
-                                  <a:lumMod val="50000"/>
-                                </a:schemeClr>
-                              </a:solidFill>
-                              <a:latin typeface="Cambria Math" panose="02040503050406030204" pitchFamily="18" charset="0"/>
-                            </a:rPr>
-                            <m:t>′</m:t>
-                          </m:r>
-                        </m:oMath>
-                      </m:oMathPara>
-                    </a14:m>
-                    <a:endParaRPr lang="en-US" dirty="0">
-                      <a:solidFill>
-                        <a:schemeClr val="bg1">
-                          <a:lumMod val="50000"/>
-                        </a:schemeClr>
-                      </a:solidFill>
-                    </a:endParaRPr>
-                  </a:p>
-                </p:txBody>
-              </p:sp>
-            </mc:Choice>
-            <mc:Fallback xmlns="">
-              <p:sp>
-                <p:nvSpPr>
-                  <p:cNvPr id="81" name="TextBox 80">
-                    <a:extLst>
-                      <a:ext uri="{FF2B5EF4-FFF2-40B4-BE49-F238E27FC236}">
-                        <a16:creationId xmlns:a16="http://schemas.microsoft.com/office/drawing/2014/main" id="{BCDBAB5A-DD10-9749-B0A0-AE4927869399}"/>
-                      </a:ext>
-                    </a:extLst>
-                  </p:cNvPr>
-                  <p:cNvSpPr txBox="1">
-                    <a:spLocks noRot="1" noChangeAspect="1" noMove="1" noResize="1" noEditPoints="1" noAdjustHandles="1" noChangeArrowheads="1" noChangeShapeType="1" noTextEdit="1"/>
-                  </p:cNvSpPr>
-                  <p:nvPr/>
-                </p:nvSpPr>
-                <p:spPr>
-                  <a:xfrm>
-                    <a:off x="7261084" y="2194860"/>
-                    <a:ext cx="540831" cy="369332"/>
-                  </a:xfrm>
-                  <a:prstGeom prst="rect">
-                    <a:avLst/>
-                  </a:prstGeom>
-                  <a:blipFill>
-                    <a:blip r:embed="rId17"/>
-                    <a:stretch>
-                      <a:fillRect/>
-                    </a:stretch>
-                  </a:blipFill>
-                  <a:ln>
-                    <a:noFill/>
-                  </a:ln>
-                </p:spPr>
-                <p:txBody>
-                  <a:bodyPr/>
-                  <a:lstStyle/>
-                  <a:p>
-                    <a:r>
-                      <a:rPr lang="en-US">
-                        <a:noFill/>
-                      </a:rPr>
-                      <a:t> </a:t>
-                    </a:r>
-                  </a:p>
-                </p:txBody>
-              </p:sp>
-            </mc:Fallback>
-          </mc:AlternateContent>
-        </p:grpSp>
-        <p:pic>
-          <p:nvPicPr>
-            <p:cNvPr id="77" name="Picture 76">
+            <a:prstGeom prst="straightConnector1">
+              <a:avLst/>
+            </a:prstGeom>
+            <a:ln>
+              <a:solidFill>
+                <a:schemeClr val="bg1">
+                  <a:lumMod val="50000"/>
+                </a:schemeClr>
+              </a:solidFill>
+              <a:tailEnd type="arrow"/>
+            </a:ln>
+          </p:spPr>
+          <p:style>
+            <a:lnRef idx="2">
+              <a:schemeClr val="dk1"/>
+            </a:lnRef>
+            <a:fillRef idx="0">
+              <a:schemeClr val="dk1"/>
+            </a:fillRef>
+            <a:effectRef idx="1">
+              <a:schemeClr val="dk1"/>
+            </a:effectRef>
+            <a:fontRef idx="minor">
+              <a:schemeClr val="tx1"/>
+            </a:fontRef>
+          </p:style>
+        </p:cxnSp>
+        <p:cxnSp>
+          <p:nvCxnSpPr>
+            <p:cNvPr id="79" name="Straight Arrow Connector 78">
               <a:extLst>
                 <a:ext uri="{FF2B5EF4-FFF2-40B4-BE49-F238E27FC236}">
-                  <a16:creationId xmlns:a16="http://schemas.microsoft.com/office/drawing/2014/main" id="{721A5504-F30B-0E47-ACEE-309EA9008B48}"/>
+                  <a16:creationId xmlns:a16="http://schemas.microsoft.com/office/drawing/2014/main" id="{449EC965-62A0-9B4D-8850-C482FA0505A6}"/>
                 </a:ext>
               </a:extLst>
             </p:cNvPr>
-            <p:cNvPicPr>
-              <a:picLocks noChangeAspect="1"/>
-            </p:cNvPicPr>
+            <p:cNvCxnSpPr>
+              <a:cxnSpLocks/>
+            </p:cNvCxnSpPr>
             <p:nvPr/>
-          </p:nvPicPr>
-          <p:blipFill>
-            <a:blip r:embed="rId15">
-              <a:duotone>
-                <a:schemeClr val="bg2">
-                  <a:shade val="45000"/>
-                  <a:satMod val="135000"/>
-                </a:schemeClr>
-                <a:prstClr val="white"/>
-              </a:duotone>
-              <a:extLst>
-                <a:ext uri="{28A0092B-C50C-407E-A947-70E740481C1C}">
-                  <a14:useLocalDpi xmlns:a14="http://schemas.microsoft.com/office/drawing/2010/main" val="0"/>
-                </a:ext>
-              </a:extLst>
-            </a:blip>
-            <a:stretch>
-              <a:fillRect/>
-            </a:stretch>
-          </p:blipFill>
+          </p:nvCxnSpPr>
           <p:spPr>
-            <a:xfrm flipH="1">
-              <a:off x="4338740" y="3868918"/>
-              <a:ext cx="731312" cy="664027"/>
+            <a:xfrm flipV="1">
+              <a:off x="6186824" y="1258587"/>
+              <a:ext cx="0" cy="1135330"/>
             </a:xfrm>
-            <a:prstGeom prst="rect">
+            <a:prstGeom prst="straightConnector1">
               <a:avLst/>
             </a:prstGeom>
             <a:ln>
-              <a:noFill/>
+              <a:solidFill>
+                <a:schemeClr val="bg1">
+                  <a:lumMod val="50000"/>
+                </a:schemeClr>
+              </a:solidFill>
+              <a:tailEnd type="arrow"/>
             </a:ln>
           </p:spPr>
-        </p:pic>
+          <p:style>
+            <a:lnRef idx="2">
+              <a:schemeClr val="dk1"/>
+            </a:lnRef>
+            <a:fillRef idx="0">
+              <a:schemeClr val="dk1"/>
+            </a:fillRef>
+            <a:effectRef idx="1">
+              <a:schemeClr val="dk1"/>
+            </a:effectRef>
+            <a:fontRef idx="minor">
+              <a:schemeClr val="tx1"/>
+            </a:fontRef>
+          </p:style>
+        </p:cxnSp>
+        <mc:AlternateContent xmlns:mc="http://schemas.openxmlformats.org/markup-compatibility/2006" xmlns:a14="http://schemas.microsoft.com/office/drawing/2010/main">
+          <mc:Choice Requires="a14">
+            <p:sp>
+              <p:nvSpPr>
+                <p:cNvPr id="80" name="TextBox 79">
+                  <a:extLst>
+                    <a:ext uri="{FF2B5EF4-FFF2-40B4-BE49-F238E27FC236}">
+                      <a16:creationId xmlns:a16="http://schemas.microsoft.com/office/drawing/2014/main" id="{52641E6B-8B99-234C-836A-512D5F8708DC}"/>
+                    </a:ext>
+                  </a:extLst>
+                </p:cNvPr>
+                <p:cNvSpPr txBox="1"/>
+                <p:nvPr/>
+              </p:nvSpPr>
+              <p:spPr>
+                <a:xfrm>
+                  <a:off x="5715689" y="1097461"/>
+                  <a:ext cx="549989" cy="369332"/>
+                </a:xfrm>
+                <a:prstGeom prst="rect">
+                  <a:avLst/>
+                </a:prstGeom>
+                <a:noFill/>
+                <a:ln>
+                  <a:noFill/>
+                </a:ln>
+              </p:spPr>
+              <p:txBody>
+                <a:bodyPr wrap="square" rtlCol="0">
+                  <a:spAutoFit/>
+                </a:bodyPr>
+                <a:lstStyle/>
+                <a:p>
+                  <a:pPr/>
+                  <a14:m>
+                    <m:oMathPara xmlns:m="http://schemas.openxmlformats.org/officeDocument/2006/math">
+                      <m:oMathParaPr>
+                        <m:jc m:val="centerGroup"/>
+                      </m:oMathParaPr>
+                      <m:oMath xmlns:m="http://schemas.openxmlformats.org/officeDocument/2006/math">
+                        <m:r>
+                          <a:rPr lang="en-CA" b="0" i="1" smtClean="0">
+                            <a:solidFill>
+                              <a:schemeClr val="bg1">
+                                <a:lumMod val="50000"/>
+                              </a:schemeClr>
+                            </a:solidFill>
+                            <a:latin typeface="Cambria Math" panose="02040503050406030204" pitchFamily="18" charset="0"/>
+                          </a:rPr>
+                          <m:t>𝑦</m:t>
+                        </m:r>
+                        <m:r>
+                          <a:rPr lang="en-CA" b="0" i="1" smtClean="0">
+                            <a:solidFill>
+                              <a:schemeClr val="bg1">
+                                <a:lumMod val="50000"/>
+                              </a:schemeClr>
+                            </a:solidFill>
+                            <a:latin typeface="Cambria Math" panose="02040503050406030204" pitchFamily="18" charset="0"/>
+                          </a:rPr>
+                          <m:t>′</m:t>
+                        </m:r>
+                      </m:oMath>
+                    </m:oMathPara>
+                  </a14:m>
+                  <a:endParaRPr lang="en-US" dirty="0">
+                    <a:solidFill>
+                      <a:schemeClr val="bg1">
+                        <a:lumMod val="50000"/>
+                      </a:schemeClr>
+                    </a:solidFill>
+                  </a:endParaRPr>
+                </a:p>
+              </p:txBody>
+            </p:sp>
+          </mc:Choice>
+          <mc:Fallback xmlns="">
+            <p:sp>
+              <p:nvSpPr>
+                <p:cNvPr id="80" name="TextBox 79">
+                  <a:extLst>
+                    <a:ext uri="{FF2B5EF4-FFF2-40B4-BE49-F238E27FC236}">
+                      <a16:creationId xmlns:a16="http://schemas.microsoft.com/office/drawing/2014/main" id="{52641E6B-8B99-234C-836A-512D5F8708DC}"/>
+                    </a:ext>
+                  </a:extLst>
+                </p:cNvPr>
+                <p:cNvSpPr txBox="1">
+                  <a:spLocks noRot="1" noChangeAspect="1" noMove="1" noResize="1" noEditPoints="1" noAdjustHandles="1" noChangeArrowheads="1" noChangeShapeType="1" noTextEdit="1"/>
+                </p:cNvSpPr>
+                <p:nvPr/>
+              </p:nvSpPr>
+              <p:spPr>
+                <a:xfrm>
+                  <a:off x="5715689" y="1097461"/>
+                  <a:ext cx="549989" cy="369332"/>
+                </a:xfrm>
+                <a:prstGeom prst="rect">
+                  <a:avLst/>
+                </a:prstGeom>
+                <a:blipFill>
+                  <a:blip r:embed="rId15"/>
+                  <a:stretch>
+                    <a:fillRect/>
+                  </a:stretch>
+                </a:blipFill>
+                <a:ln>
+                  <a:noFill/>
+                </a:ln>
+              </p:spPr>
+              <p:txBody>
+                <a:bodyPr/>
+                <a:lstStyle/>
+                <a:p>
+                  <a:r>
+                    <a:rPr lang="en-US">
+                      <a:noFill/>
+                    </a:rPr>
+                    <a:t> </a:t>
+                  </a:r>
+                </a:p>
+              </p:txBody>
+            </p:sp>
+          </mc:Fallback>
+        </mc:AlternateContent>
+        <mc:AlternateContent xmlns:mc="http://schemas.openxmlformats.org/markup-compatibility/2006" xmlns:a14="http://schemas.microsoft.com/office/drawing/2010/main">
+          <mc:Choice Requires="a14">
+            <p:sp>
+              <p:nvSpPr>
+                <p:cNvPr id="81" name="TextBox 80">
+                  <a:extLst>
+                    <a:ext uri="{FF2B5EF4-FFF2-40B4-BE49-F238E27FC236}">
+                      <a16:creationId xmlns:a16="http://schemas.microsoft.com/office/drawing/2014/main" id="{BCDBAB5A-DD10-9749-B0A0-AE4927869399}"/>
+                    </a:ext>
+                  </a:extLst>
+                </p:cNvPr>
+                <p:cNvSpPr txBox="1"/>
+                <p:nvPr/>
+              </p:nvSpPr>
+              <p:spPr>
+                <a:xfrm>
+                  <a:off x="7261084" y="2194860"/>
+                  <a:ext cx="540831" cy="369332"/>
+                </a:xfrm>
+                <a:prstGeom prst="rect">
+                  <a:avLst/>
+                </a:prstGeom>
+                <a:noFill/>
+                <a:ln>
+                  <a:noFill/>
+                </a:ln>
+              </p:spPr>
+              <p:txBody>
+                <a:bodyPr wrap="square" rtlCol="0">
+                  <a:spAutoFit/>
+                </a:bodyPr>
+                <a:lstStyle/>
+                <a:p>
+                  <a:pPr/>
+                  <a14:m>
+                    <m:oMathPara xmlns:m="http://schemas.openxmlformats.org/officeDocument/2006/math">
+                      <m:oMathParaPr>
+                        <m:jc m:val="centerGroup"/>
+                      </m:oMathParaPr>
+                      <m:oMath xmlns:m="http://schemas.openxmlformats.org/officeDocument/2006/math">
+                        <m:r>
+                          <a:rPr lang="en-CA" b="0" i="1" smtClean="0">
+                            <a:solidFill>
+                              <a:schemeClr val="bg1">
+                                <a:lumMod val="50000"/>
+                              </a:schemeClr>
+                            </a:solidFill>
+                            <a:latin typeface="Cambria Math" panose="02040503050406030204" pitchFamily="18" charset="0"/>
+                          </a:rPr>
+                          <m:t>𝑥</m:t>
+                        </m:r>
+                        <m:r>
+                          <a:rPr lang="en-CA" b="0" i="1" smtClean="0">
+                            <a:solidFill>
+                              <a:schemeClr val="bg1">
+                                <a:lumMod val="50000"/>
+                              </a:schemeClr>
+                            </a:solidFill>
+                            <a:latin typeface="Cambria Math" panose="02040503050406030204" pitchFamily="18" charset="0"/>
+                          </a:rPr>
+                          <m:t>′</m:t>
+                        </m:r>
+                      </m:oMath>
+                    </m:oMathPara>
+                  </a14:m>
+                  <a:endParaRPr lang="en-US" dirty="0">
+                    <a:solidFill>
+                      <a:schemeClr val="bg1">
+                        <a:lumMod val="50000"/>
+                      </a:schemeClr>
+                    </a:solidFill>
+                  </a:endParaRPr>
+                </a:p>
+              </p:txBody>
+            </p:sp>
+          </mc:Choice>
+          <mc:Fallback xmlns="">
+            <p:sp>
+              <p:nvSpPr>
+                <p:cNvPr id="81" name="TextBox 80">
+                  <a:extLst>
+                    <a:ext uri="{FF2B5EF4-FFF2-40B4-BE49-F238E27FC236}">
+                      <a16:creationId xmlns:a16="http://schemas.microsoft.com/office/drawing/2014/main" id="{BCDBAB5A-DD10-9749-B0A0-AE4927869399}"/>
+                    </a:ext>
+                  </a:extLst>
+                </p:cNvPr>
+                <p:cNvSpPr txBox="1">
+                  <a:spLocks noRot="1" noChangeAspect="1" noMove="1" noResize="1" noEditPoints="1" noAdjustHandles="1" noChangeArrowheads="1" noChangeShapeType="1" noTextEdit="1"/>
+                </p:cNvSpPr>
+                <p:nvPr/>
+              </p:nvSpPr>
+              <p:spPr>
+                <a:xfrm>
+                  <a:off x="7261084" y="2194860"/>
+                  <a:ext cx="540831" cy="369332"/>
+                </a:xfrm>
+                <a:prstGeom prst="rect">
+                  <a:avLst/>
+                </a:prstGeom>
+                <a:blipFill>
+                  <a:blip r:embed="rId16"/>
+                  <a:stretch>
+                    <a:fillRect/>
+                  </a:stretch>
+                </a:blipFill>
+                <a:ln>
+                  <a:noFill/>
+                </a:ln>
+              </p:spPr>
+              <p:txBody>
+                <a:bodyPr/>
+                <a:lstStyle/>
+                <a:p>
+                  <a:r>
+                    <a:rPr lang="en-US">
+                      <a:noFill/>
+                    </a:rPr>
+                    <a:t> </a:t>
+                  </a:r>
+                </a:p>
+              </p:txBody>
+            </p:sp>
+          </mc:Fallback>
+        </mc:AlternateContent>
       </p:grpSp>
       <p:sp>
         <p:nvSpPr>
@@ -17945,10 +17911,10 @@
       </p:sp>
       <p:grpSp>
         <p:nvGrpSpPr>
-          <p:cNvPr id="6" name="Group 5">
+          <p:cNvPr id="31" name="Group 30">
             <a:extLst>
               <a:ext uri="{FF2B5EF4-FFF2-40B4-BE49-F238E27FC236}">
-                <a16:creationId xmlns:a16="http://schemas.microsoft.com/office/drawing/2014/main" id="{8BAD0B43-ADF3-7D4D-BD34-BA5E46342383}"/>
+                <a16:creationId xmlns:a16="http://schemas.microsoft.com/office/drawing/2014/main" id="{3DBDDD1D-0715-AB4D-B826-A8176511FCF5}"/>
               </a:ext>
             </a:extLst>
           </p:cNvPr>
@@ -17959,353 +17925,296 @@
           <a:xfrm rot="19813470">
             <a:off x="5447626" y="2597850"/>
             <a:ext cx="2086226" cy="1466731"/>
-            <a:chOff x="5561911" y="2901732"/>
+            <a:chOff x="5715689" y="1097461"/>
             <a:chExt cx="2086226" cy="1466731"/>
           </a:xfrm>
         </p:grpSpPr>
-        <p:grpSp>
-          <p:nvGrpSpPr>
-            <p:cNvPr id="31" name="Group 30">
+        <p:cxnSp>
+          <p:nvCxnSpPr>
+            <p:cNvPr id="32" name="Straight Arrow Connector 31">
               <a:extLst>
                 <a:ext uri="{FF2B5EF4-FFF2-40B4-BE49-F238E27FC236}">
-                  <a16:creationId xmlns:a16="http://schemas.microsoft.com/office/drawing/2014/main" id="{3DBDDD1D-0715-AB4D-B826-A8176511FCF5}"/>
+                  <a16:creationId xmlns:a16="http://schemas.microsoft.com/office/drawing/2014/main" id="{B505010C-D5FD-924D-A580-6838D2769FA3}"/>
                 </a:ext>
               </a:extLst>
             </p:cNvPr>
-            <p:cNvGrpSpPr/>
+            <p:cNvCxnSpPr>
+              <a:cxnSpLocks/>
+            </p:cNvCxnSpPr>
             <p:nvPr/>
-          </p:nvGrpSpPr>
-          <p:grpSpPr>
-            <a:xfrm>
-              <a:off x="5561911" y="2901732"/>
-              <a:ext cx="2086226" cy="1466731"/>
-              <a:chOff x="5715689" y="1097461"/>
-              <a:chExt cx="2086226" cy="1466731"/>
+          </p:nvCxnSpPr>
+          <p:spPr>
+            <a:xfrm flipV="1">
+              <a:off x="6168637" y="2393917"/>
+              <a:ext cx="1222763" cy="7898"/>
             </a:xfrm>
-          </p:grpSpPr>
-          <p:cxnSp>
-            <p:nvCxnSpPr>
-              <p:cNvPr id="32" name="Straight Arrow Connector 31">
-                <a:extLst>
-                  <a:ext uri="{FF2B5EF4-FFF2-40B4-BE49-F238E27FC236}">
-                    <a16:creationId xmlns:a16="http://schemas.microsoft.com/office/drawing/2014/main" id="{B505010C-D5FD-924D-A580-6838D2769FA3}"/>
-                  </a:ext>
-                </a:extLst>
-              </p:cNvPr>
-              <p:cNvCxnSpPr>
-                <a:cxnSpLocks/>
-              </p:cNvCxnSpPr>
-              <p:nvPr/>
-            </p:nvCxnSpPr>
-            <p:spPr>
-              <a:xfrm flipV="1">
-                <a:off x="6168637" y="2393917"/>
-                <a:ext cx="1222763" cy="7898"/>
-              </a:xfrm>
-              <a:prstGeom prst="straightConnector1">
-                <a:avLst/>
-              </a:prstGeom>
-              <a:ln>
-                <a:tailEnd type="arrow"/>
-              </a:ln>
-            </p:spPr>
-            <p:style>
-              <a:lnRef idx="2">
-                <a:schemeClr val="dk1"/>
-              </a:lnRef>
-              <a:fillRef idx="0">
-                <a:schemeClr val="dk1"/>
-              </a:fillRef>
-              <a:effectRef idx="1">
-                <a:schemeClr val="dk1"/>
-              </a:effectRef>
-              <a:fontRef idx="minor">
-                <a:schemeClr val="tx1"/>
-              </a:fontRef>
-            </p:style>
-          </p:cxnSp>
-          <p:cxnSp>
-            <p:nvCxnSpPr>
-              <p:cNvPr id="33" name="Straight Arrow Connector 32">
-                <a:extLst>
-                  <a:ext uri="{FF2B5EF4-FFF2-40B4-BE49-F238E27FC236}">
-                    <a16:creationId xmlns:a16="http://schemas.microsoft.com/office/drawing/2014/main" id="{6CEA27E7-A1F1-0F42-B7E6-AC2A511C33B0}"/>
-                  </a:ext>
-                </a:extLst>
-              </p:cNvPr>
-              <p:cNvCxnSpPr>
-                <a:cxnSpLocks/>
-              </p:cNvCxnSpPr>
-              <p:nvPr/>
-            </p:nvCxnSpPr>
-            <p:spPr>
-              <a:xfrm flipV="1">
-                <a:off x="6186824" y="1258587"/>
-                <a:ext cx="0" cy="1135330"/>
-              </a:xfrm>
-              <a:prstGeom prst="straightConnector1">
-                <a:avLst/>
-              </a:prstGeom>
-              <a:ln>
-                <a:tailEnd type="arrow"/>
-              </a:ln>
-            </p:spPr>
-            <p:style>
-              <a:lnRef idx="2">
-                <a:schemeClr val="dk1"/>
-              </a:lnRef>
-              <a:fillRef idx="0">
-                <a:schemeClr val="dk1"/>
-              </a:fillRef>
-              <a:effectRef idx="1">
-                <a:schemeClr val="dk1"/>
-              </a:effectRef>
-              <a:fontRef idx="minor">
-                <a:schemeClr val="tx1"/>
-              </a:fontRef>
-            </p:style>
-          </p:cxnSp>
-          <mc:AlternateContent xmlns:mc="http://schemas.openxmlformats.org/markup-compatibility/2006" xmlns:a14="http://schemas.microsoft.com/office/drawing/2010/main">
-            <mc:Choice Requires="a14">
-              <p:sp>
-                <p:nvSpPr>
-                  <p:cNvPr id="34" name="TextBox 33">
-                    <a:extLst>
-                      <a:ext uri="{FF2B5EF4-FFF2-40B4-BE49-F238E27FC236}">
-                        <a16:creationId xmlns:a16="http://schemas.microsoft.com/office/drawing/2014/main" id="{FF20E9F9-4F2C-554C-BFC1-ED23632AE090}"/>
-                      </a:ext>
-                    </a:extLst>
-                  </p:cNvPr>
-                  <p:cNvSpPr txBox="1"/>
-                  <p:nvPr/>
-                </p:nvSpPr>
-                <p:spPr>
-                  <a:xfrm>
-                    <a:off x="5715689" y="1097461"/>
-                    <a:ext cx="549989" cy="369332"/>
-                  </a:xfrm>
-                  <a:prstGeom prst="rect">
-                    <a:avLst/>
-                  </a:prstGeom>
-                  <a:noFill/>
-                </p:spPr>
-                <p:txBody>
-                  <a:bodyPr wrap="square" rtlCol="0">
-                    <a:spAutoFit/>
-                  </a:bodyPr>
-                  <a:lstStyle/>
-                  <a:p>
-                    <a:pPr/>
-                    <a14:m>
-                      <m:oMathPara xmlns:m="http://schemas.openxmlformats.org/officeDocument/2006/math">
-                        <m:oMathParaPr>
-                          <m:jc m:val="centerGroup"/>
-                        </m:oMathParaPr>
-                        <m:oMath xmlns:m="http://schemas.openxmlformats.org/officeDocument/2006/math">
-                          <m:r>
-                            <a:rPr lang="en-CA" b="0" i="1" smtClean="0">
-                              <a:latin typeface="Cambria Math" panose="02040503050406030204" pitchFamily="18" charset="0"/>
-                            </a:rPr>
-                            <m:t>𝑦</m:t>
-                          </m:r>
-                          <m:r>
-                            <a:rPr lang="en-CA" b="0" i="1" smtClean="0">
-                              <a:latin typeface="Cambria Math" panose="02040503050406030204" pitchFamily="18" charset="0"/>
-                            </a:rPr>
-                            <m:t>′</m:t>
-                          </m:r>
-                        </m:oMath>
-                      </m:oMathPara>
-                    </a14:m>
-                    <a:endParaRPr lang="en-US" dirty="0"/>
-                  </a:p>
-                </p:txBody>
-              </p:sp>
-            </mc:Choice>
-            <mc:Fallback xmlns="">
-              <p:sp>
-                <p:nvSpPr>
-                  <p:cNvPr id="34" name="TextBox 33">
-                    <a:extLst>
-                      <a:ext uri="{FF2B5EF4-FFF2-40B4-BE49-F238E27FC236}">
-                        <a16:creationId xmlns:a16="http://schemas.microsoft.com/office/drawing/2014/main" id="{FF20E9F9-4F2C-554C-BFC1-ED23632AE090}"/>
-                      </a:ext>
-                    </a:extLst>
-                  </p:cNvPr>
-                  <p:cNvSpPr txBox="1">
-                    <a:spLocks noRot="1" noChangeAspect="1" noMove="1" noResize="1" noEditPoints="1" noAdjustHandles="1" noChangeArrowheads="1" noChangeShapeType="1" noTextEdit="1"/>
-                  </p:cNvSpPr>
-                  <p:nvPr/>
-                </p:nvSpPr>
-                <p:spPr>
-                  <a:xfrm>
-                    <a:off x="5715689" y="1097461"/>
-                    <a:ext cx="549989" cy="369332"/>
-                  </a:xfrm>
-                  <a:prstGeom prst="rect">
-                    <a:avLst/>
-                  </a:prstGeom>
-                  <a:blipFill>
-                    <a:blip r:embed="rId18"/>
-                    <a:stretch>
-                      <a:fillRect b="-2083"/>
-                    </a:stretch>
-                  </a:blipFill>
-                </p:spPr>
-                <p:txBody>
-                  <a:bodyPr/>
-                  <a:lstStyle/>
-                  <a:p>
-                    <a:r>
-                      <a:rPr lang="en-US">
-                        <a:noFill/>
-                      </a:rPr>
-                      <a:t> </a:t>
-                    </a:r>
-                  </a:p>
-                </p:txBody>
-              </p:sp>
-            </mc:Fallback>
-          </mc:AlternateContent>
-          <mc:AlternateContent xmlns:mc="http://schemas.openxmlformats.org/markup-compatibility/2006" xmlns:a14="http://schemas.microsoft.com/office/drawing/2010/main">
-            <mc:Choice Requires="a14">
-              <p:sp>
-                <p:nvSpPr>
-                  <p:cNvPr id="35" name="TextBox 34">
-                    <a:extLst>
-                      <a:ext uri="{FF2B5EF4-FFF2-40B4-BE49-F238E27FC236}">
-                        <a16:creationId xmlns:a16="http://schemas.microsoft.com/office/drawing/2014/main" id="{0FD8E1D0-E484-284E-8499-46F8751B87D7}"/>
-                      </a:ext>
-                    </a:extLst>
-                  </p:cNvPr>
-                  <p:cNvSpPr txBox="1"/>
-                  <p:nvPr/>
-                </p:nvSpPr>
-                <p:spPr>
-                  <a:xfrm>
-                    <a:off x="7261084" y="2194860"/>
-                    <a:ext cx="540831" cy="369332"/>
-                  </a:xfrm>
-                  <a:prstGeom prst="rect">
-                    <a:avLst/>
-                  </a:prstGeom>
-                  <a:noFill/>
-                </p:spPr>
-                <p:txBody>
-                  <a:bodyPr wrap="square" rtlCol="0">
-                    <a:spAutoFit/>
-                  </a:bodyPr>
-                  <a:lstStyle/>
-                  <a:p>
-                    <a:pPr/>
-                    <a14:m>
-                      <m:oMathPara xmlns:m="http://schemas.openxmlformats.org/officeDocument/2006/math">
-                        <m:oMathParaPr>
-                          <m:jc m:val="centerGroup"/>
-                        </m:oMathParaPr>
-                        <m:oMath xmlns:m="http://schemas.openxmlformats.org/officeDocument/2006/math">
-                          <m:r>
-                            <a:rPr lang="en-CA" b="0" i="1" smtClean="0">
-                              <a:latin typeface="Cambria Math" panose="02040503050406030204" pitchFamily="18" charset="0"/>
-                            </a:rPr>
-                            <m:t>𝑥</m:t>
-                          </m:r>
-                          <m:r>
-                            <a:rPr lang="en-CA" b="0" i="1" smtClean="0">
-                              <a:latin typeface="Cambria Math" panose="02040503050406030204" pitchFamily="18" charset="0"/>
-                            </a:rPr>
-                            <m:t>′</m:t>
-                          </m:r>
-                        </m:oMath>
-                      </m:oMathPara>
-                    </a14:m>
-                    <a:endParaRPr lang="en-US" dirty="0"/>
-                  </a:p>
-                </p:txBody>
-              </p:sp>
-            </mc:Choice>
-            <mc:Fallback xmlns="">
-              <p:sp>
-                <p:nvSpPr>
-                  <p:cNvPr id="35" name="TextBox 34">
-                    <a:extLst>
-                      <a:ext uri="{FF2B5EF4-FFF2-40B4-BE49-F238E27FC236}">
-                        <a16:creationId xmlns:a16="http://schemas.microsoft.com/office/drawing/2014/main" id="{0FD8E1D0-E484-284E-8499-46F8751B87D7}"/>
-                      </a:ext>
-                    </a:extLst>
-                  </p:cNvPr>
-                  <p:cNvSpPr txBox="1">
-                    <a:spLocks noRot="1" noChangeAspect="1" noMove="1" noResize="1" noEditPoints="1" noAdjustHandles="1" noChangeArrowheads="1" noChangeShapeType="1" noTextEdit="1"/>
-                  </p:cNvSpPr>
-                  <p:nvPr/>
-                </p:nvSpPr>
-                <p:spPr>
-                  <a:xfrm>
-                    <a:off x="7261084" y="2194860"/>
-                    <a:ext cx="540831" cy="369332"/>
-                  </a:xfrm>
-                  <a:prstGeom prst="rect">
-                    <a:avLst/>
-                  </a:prstGeom>
-                  <a:blipFill>
-                    <a:blip r:embed="rId19"/>
-                    <a:stretch>
-                      <a:fillRect/>
-                    </a:stretch>
-                  </a:blipFill>
-                </p:spPr>
-                <p:txBody>
-                  <a:bodyPr/>
-                  <a:lstStyle/>
-                  <a:p>
-                    <a:r>
-                      <a:rPr lang="en-US">
-                        <a:noFill/>
-                      </a:rPr>
-                      <a:t> </a:t>
-                    </a:r>
-                  </a:p>
-                </p:txBody>
-              </p:sp>
-            </mc:Fallback>
-          </mc:AlternateContent>
-        </p:grpSp>
-        <p:pic>
-          <p:nvPicPr>
-            <p:cNvPr id="43" name="Picture 42">
+            <a:prstGeom prst="straightConnector1">
+              <a:avLst/>
+            </a:prstGeom>
+            <a:ln>
+              <a:tailEnd type="arrow"/>
+            </a:ln>
+          </p:spPr>
+          <p:style>
+            <a:lnRef idx="2">
+              <a:schemeClr val="dk1"/>
+            </a:lnRef>
+            <a:fillRef idx="0">
+              <a:schemeClr val="dk1"/>
+            </a:fillRef>
+            <a:effectRef idx="1">
+              <a:schemeClr val="dk1"/>
+            </a:effectRef>
+            <a:fontRef idx="minor">
+              <a:schemeClr val="tx1"/>
+            </a:fontRef>
+          </p:style>
+        </p:cxnSp>
+        <p:cxnSp>
+          <p:nvCxnSpPr>
+            <p:cNvPr id="33" name="Straight Arrow Connector 32">
               <a:extLst>
                 <a:ext uri="{FF2B5EF4-FFF2-40B4-BE49-F238E27FC236}">
-                  <a16:creationId xmlns:a16="http://schemas.microsoft.com/office/drawing/2014/main" id="{01449C6A-B489-9641-A236-EA93FF3B179E}"/>
+                  <a16:creationId xmlns:a16="http://schemas.microsoft.com/office/drawing/2014/main" id="{6CEA27E7-A1F1-0F42-B7E6-AC2A511C33B0}"/>
                 </a:ext>
               </a:extLst>
             </p:cNvPr>
-            <p:cNvPicPr>
-              <a:picLocks noChangeAspect="1"/>
-            </p:cNvPicPr>
+            <p:cNvCxnSpPr>
+              <a:cxnSpLocks/>
+            </p:cNvCxnSpPr>
             <p:nvPr/>
-          </p:nvPicPr>
-          <p:blipFill>
-            <a:blip r:embed="rId15">
-              <a:extLst>
-                <a:ext uri="{28A0092B-C50C-407E-A947-70E740481C1C}">
-                  <a14:useLocalDpi xmlns:a14="http://schemas.microsoft.com/office/drawing/2010/main" val="0"/>
-                </a:ext>
-              </a:extLst>
-            </a:blip>
-            <a:stretch>
-              <a:fillRect/>
-            </a:stretch>
-          </p:blipFill>
+          </p:nvCxnSpPr>
           <p:spPr>
-            <a:xfrm flipH="1">
-              <a:off x="5901260" y="3577123"/>
-              <a:ext cx="731312" cy="664027"/>
+            <a:xfrm flipV="1">
+              <a:off x="6186824" y="1258587"/>
+              <a:ext cx="0" cy="1135330"/>
             </a:xfrm>
-            <a:prstGeom prst="rect">
+            <a:prstGeom prst="straightConnector1">
               <a:avLst/>
             </a:prstGeom>
+            <a:ln>
+              <a:tailEnd type="arrow"/>
+            </a:ln>
           </p:spPr>
-        </p:pic>
+          <p:style>
+            <a:lnRef idx="2">
+              <a:schemeClr val="dk1"/>
+            </a:lnRef>
+            <a:fillRef idx="0">
+              <a:schemeClr val="dk1"/>
+            </a:fillRef>
+            <a:effectRef idx="1">
+              <a:schemeClr val="dk1"/>
+            </a:effectRef>
+            <a:fontRef idx="minor">
+              <a:schemeClr val="tx1"/>
+            </a:fontRef>
+          </p:style>
+        </p:cxnSp>
+        <mc:AlternateContent xmlns:mc="http://schemas.openxmlformats.org/markup-compatibility/2006" xmlns:a14="http://schemas.microsoft.com/office/drawing/2010/main">
+          <mc:Choice Requires="a14">
+            <p:sp>
+              <p:nvSpPr>
+                <p:cNvPr id="34" name="TextBox 33">
+                  <a:extLst>
+                    <a:ext uri="{FF2B5EF4-FFF2-40B4-BE49-F238E27FC236}">
+                      <a16:creationId xmlns:a16="http://schemas.microsoft.com/office/drawing/2014/main" id="{FF20E9F9-4F2C-554C-BFC1-ED23632AE090}"/>
+                    </a:ext>
+                  </a:extLst>
+                </p:cNvPr>
+                <p:cNvSpPr txBox="1"/>
+                <p:nvPr/>
+              </p:nvSpPr>
+              <p:spPr>
+                <a:xfrm>
+                  <a:off x="5715689" y="1097461"/>
+                  <a:ext cx="549989" cy="369332"/>
+                </a:xfrm>
+                <a:prstGeom prst="rect">
+                  <a:avLst/>
+                </a:prstGeom>
+                <a:noFill/>
+              </p:spPr>
+              <p:txBody>
+                <a:bodyPr wrap="square" rtlCol="0">
+                  <a:spAutoFit/>
+                </a:bodyPr>
+                <a:lstStyle/>
+                <a:p>
+                  <a:pPr/>
+                  <a14:m>
+                    <m:oMathPara xmlns:m="http://schemas.openxmlformats.org/officeDocument/2006/math">
+                      <m:oMathParaPr>
+                        <m:jc m:val="centerGroup"/>
+                      </m:oMathParaPr>
+                      <m:oMath xmlns:m="http://schemas.openxmlformats.org/officeDocument/2006/math">
+                        <m:r>
+                          <a:rPr lang="en-CA" b="0" i="1" smtClean="0">
+                            <a:latin typeface="Cambria Math" panose="02040503050406030204" pitchFamily="18" charset="0"/>
+                          </a:rPr>
+                          <m:t>𝑦</m:t>
+                        </m:r>
+                        <m:r>
+                          <a:rPr lang="en-CA" b="0" i="1" smtClean="0">
+                            <a:latin typeface="Cambria Math" panose="02040503050406030204" pitchFamily="18" charset="0"/>
+                          </a:rPr>
+                          <m:t>′</m:t>
+                        </m:r>
+                      </m:oMath>
+                    </m:oMathPara>
+                  </a14:m>
+                  <a:endParaRPr lang="en-US" dirty="0"/>
+                </a:p>
+              </p:txBody>
+            </p:sp>
+          </mc:Choice>
+          <mc:Fallback xmlns="">
+            <p:sp>
+              <p:nvSpPr>
+                <p:cNvPr id="34" name="TextBox 33">
+                  <a:extLst>
+                    <a:ext uri="{FF2B5EF4-FFF2-40B4-BE49-F238E27FC236}">
+                      <a16:creationId xmlns:a16="http://schemas.microsoft.com/office/drawing/2014/main" id="{FF20E9F9-4F2C-554C-BFC1-ED23632AE090}"/>
+                    </a:ext>
+                  </a:extLst>
+                </p:cNvPr>
+                <p:cNvSpPr txBox="1">
+                  <a:spLocks noRot="1" noChangeAspect="1" noMove="1" noResize="1" noEditPoints="1" noAdjustHandles="1" noChangeArrowheads="1" noChangeShapeType="1" noTextEdit="1"/>
+                </p:cNvSpPr>
+                <p:nvPr/>
+              </p:nvSpPr>
+              <p:spPr>
+                <a:xfrm>
+                  <a:off x="5715689" y="1097461"/>
+                  <a:ext cx="549989" cy="369332"/>
+                </a:xfrm>
+                <a:prstGeom prst="rect">
+                  <a:avLst/>
+                </a:prstGeom>
+                <a:blipFill>
+                  <a:blip r:embed="rId17"/>
+                  <a:stretch>
+                    <a:fillRect b="-2083"/>
+                  </a:stretch>
+                </a:blipFill>
+              </p:spPr>
+              <p:txBody>
+                <a:bodyPr/>
+                <a:lstStyle/>
+                <a:p>
+                  <a:r>
+                    <a:rPr lang="en-US">
+                      <a:noFill/>
+                    </a:rPr>
+                    <a:t> </a:t>
+                  </a:r>
+                </a:p>
+              </p:txBody>
+            </p:sp>
+          </mc:Fallback>
+        </mc:AlternateContent>
+        <mc:AlternateContent xmlns:mc="http://schemas.openxmlformats.org/markup-compatibility/2006" xmlns:a14="http://schemas.microsoft.com/office/drawing/2010/main">
+          <mc:Choice Requires="a14">
+            <p:sp>
+              <p:nvSpPr>
+                <p:cNvPr id="35" name="TextBox 34">
+                  <a:extLst>
+                    <a:ext uri="{FF2B5EF4-FFF2-40B4-BE49-F238E27FC236}">
+                      <a16:creationId xmlns:a16="http://schemas.microsoft.com/office/drawing/2014/main" id="{0FD8E1D0-E484-284E-8499-46F8751B87D7}"/>
+                    </a:ext>
+                  </a:extLst>
+                </p:cNvPr>
+                <p:cNvSpPr txBox="1"/>
+                <p:nvPr/>
+              </p:nvSpPr>
+              <p:spPr>
+                <a:xfrm>
+                  <a:off x="7261084" y="2194860"/>
+                  <a:ext cx="540831" cy="369332"/>
+                </a:xfrm>
+                <a:prstGeom prst="rect">
+                  <a:avLst/>
+                </a:prstGeom>
+                <a:noFill/>
+              </p:spPr>
+              <p:txBody>
+                <a:bodyPr wrap="square" rtlCol="0">
+                  <a:spAutoFit/>
+                </a:bodyPr>
+                <a:lstStyle/>
+                <a:p>
+                  <a:pPr/>
+                  <a14:m>
+                    <m:oMathPara xmlns:m="http://schemas.openxmlformats.org/officeDocument/2006/math">
+                      <m:oMathParaPr>
+                        <m:jc m:val="centerGroup"/>
+                      </m:oMathParaPr>
+                      <m:oMath xmlns:m="http://schemas.openxmlformats.org/officeDocument/2006/math">
+                        <m:r>
+                          <a:rPr lang="en-CA" b="0" i="1" smtClean="0">
+                            <a:latin typeface="Cambria Math" panose="02040503050406030204" pitchFamily="18" charset="0"/>
+                          </a:rPr>
+                          <m:t>𝑥</m:t>
+                        </m:r>
+                        <m:r>
+                          <a:rPr lang="en-CA" b="0" i="1" smtClean="0">
+                            <a:latin typeface="Cambria Math" panose="02040503050406030204" pitchFamily="18" charset="0"/>
+                          </a:rPr>
+                          <m:t>′</m:t>
+                        </m:r>
+                      </m:oMath>
+                    </m:oMathPara>
+                  </a14:m>
+                  <a:endParaRPr lang="en-US" dirty="0"/>
+                </a:p>
+              </p:txBody>
+            </p:sp>
+          </mc:Choice>
+          <mc:Fallback xmlns="">
+            <p:sp>
+              <p:nvSpPr>
+                <p:cNvPr id="35" name="TextBox 34">
+                  <a:extLst>
+                    <a:ext uri="{FF2B5EF4-FFF2-40B4-BE49-F238E27FC236}">
+                      <a16:creationId xmlns:a16="http://schemas.microsoft.com/office/drawing/2014/main" id="{0FD8E1D0-E484-284E-8499-46F8751B87D7}"/>
+                    </a:ext>
+                  </a:extLst>
+                </p:cNvPr>
+                <p:cNvSpPr txBox="1">
+                  <a:spLocks noRot="1" noChangeAspect="1" noMove="1" noResize="1" noEditPoints="1" noAdjustHandles="1" noChangeArrowheads="1" noChangeShapeType="1" noTextEdit="1"/>
+                </p:cNvSpPr>
+                <p:nvPr/>
+              </p:nvSpPr>
+              <p:spPr>
+                <a:xfrm>
+                  <a:off x="7261084" y="2194860"/>
+                  <a:ext cx="540831" cy="369332"/>
+                </a:xfrm>
+                <a:prstGeom prst="rect">
+                  <a:avLst/>
+                </a:prstGeom>
+                <a:blipFill>
+                  <a:blip r:embed="rId18"/>
+                  <a:stretch>
+                    <a:fillRect/>
+                  </a:stretch>
+                </a:blipFill>
+              </p:spPr>
+              <p:txBody>
+                <a:bodyPr/>
+                <a:lstStyle/>
+                <a:p>
+                  <a:r>
+                    <a:rPr lang="en-US">
+                      <a:noFill/>
+                    </a:rPr>
+                    <a:t> </a:t>
+                  </a:r>
+                </a:p>
+              </p:txBody>
+            </p:sp>
+          </mc:Fallback>
+        </mc:AlternateContent>
       </p:grpSp>
       <p:cxnSp>
         <p:nvCxnSpPr>
@@ -18476,7 +18385,7 @@
                 <a:avLst/>
               </a:prstGeom>
               <a:blipFill>
-                <a:blip r:embed="rId20"/>
+                <a:blip r:embed="rId19"/>
                 <a:stretch>
                   <a:fillRect t="-3125" b="-9375"/>
                 </a:stretch>
@@ -18705,7 +18614,7 @@
                 <a:avLst/>
               </a:prstGeom>
               <a:blipFill>
-                <a:blip r:embed="rId21"/>
+                <a:blip r:embed="rId20"/>
                 <a:stretch>
                   <a:fillRect/>
                 </a:stretch>
@@ -18786,6 +18695,134 @@
           </a:p>
         </p:txBody>
       </p:sp>
+      <p:pic>
+        <p:nvPicPr>
+          <p:cNvPr id="87" name="Picture 86">
+            <a:extLst>
+              <a:ext uri="{FF2B5EF4-FFF2-40B4-BE49-F238E27FC236}">
+                <a16:creationId xmlns:a16="http://schemas.microsoft.com/office/drawing/2014/main" id="{860323E8-97FD-814B-AB3F-F72246A47BD6}"/>
+              </a:ext>
+            </a:extLst>
+          </p:cNvPr>
+          <p:cNvPicPr>
+            <a:picLocks noChangeAspect="1"/>
+          </p:cNvPicPr>
+          <p:nvPr/>
+        </p:nvPicPr>
+        <p:blipFill>
+          <a:blip r:embed="rId21">
+            <a:extLst>
+              <a:ext uri="{28A0092B-C50C-407E-A947-70E740481C1C}">
+                <a14:useLocalDpi xmlns:a14="http://schemas.microsoft.com/office/drawing/2010/main" val="0"/>
+              </a:ext>
+            </a:extLst>
+          </a:blip>
+          <a:stretch>
+            <a:fillRect/>
+          </a:stretch>
+        </p:blipFill>
+        <p:spPr>
+          <a:xfrm rot="19904855" flipH="1">
+            <a:off x="5961565" y="3405387"/>
+            <a:ext cx="731312" cy="664027"/>
+          </a:xfrm>
+          <a:prstGeom prst="rect">
+            <a:avLst/>
+          </a:prstGeom>
+        </p:spPr>
+      </p:pic>
+      <p:pic>
+        <p:nvPicPr>
+          <p:cNvPr id="88" name="Picture 87">
+            <a:extLst>
+              <a:ext uri="{FF2B5EF4-FFF2-40B4-BE49-F238E27FC236}">
+                <a16:creationId xmlns:a16="http://schemas.microsoft.com/office/drawing/2014/main" id="{71BF76E1-BFFE-9145-9995-919D54E32FF8}"/>
+              </a:ext>
+            </a:extLst>
+          </p:cNvPr>
+          <p:cNvPicPr>
+            <a:picLocks noChangeAspect="1"/>
+          </p:cNvPicPr>
+          <p:nvPr/>
+        </p:nvPicPr>
+        <p:blipFill>
+          <a:blip r:embed="rId21">
+            <a:duotone>
+              <a:schemeClr val="bg2">
+                <a:shade val="45000"/>
+                <a:satMod val="135000"/>
+              </a:schemeClr>
+              <a:prstClr val="white"/>
+            </a:duotone>
+            <a:extLst>
+              <a:ext uri="{28A0092B-C50C-407E-A947-70E740481C1C}">
+                <a14:useLocalDpi xmlns:a14="http://schemas.microsoft.com/office/drawing/2010/main" val="0"/>
+              </a:ext>
+            </a:extLst>
+          </a:blip>
+          <a:stretch>
+            <a:fillRect/>
+          </a:stretch>
+        </p:blipFill>
+        <p:spPr>
+          <a:xfrm rot="19449722" flipH="1">
+            <a:off x="5237398" y="3263934"/>
+            <a:ext cx="731312" cy="664027"/>
+          </a:xfrm>
+          <a:prstGeom prst="rect">
+            <a:avLst/>
+          </a:prstGeom>
+          <a:ln>
+            <a:noFill/>
+          </a:ln>
+        </p:spPr>
+      </p:pic>
+      <p:pic>
+        <p:nvPicPr>
+          <p:cNvPr id="89" name="Picture 88">
+            <a:extLst>
+              <a:ext uri="{FF2B5EF4-FFF2-40B4-BE49-F238E27FC236}">
+                <a16:creationId xmlns:a16="http://schemas.microsoft.com/office/drawing/2014/main" id="{AF2147BC-F2D5-E74E-BA16-98ABF455A121}"/>
+              </a:ext>
+            </a:extLst>
+          </p:cNvPr>
+          <p:cNvPicPr>
+            <a:picLocks noChangeAspect="1"/>
+          </p:cNvPicPr>
+          <p:nvPr/>
+        </p:nvPicPr>
+        <p:blipFill>
+          <a:blip r:embed="rId21">
+            <a:duotone>
+              <a:schemeClr val="bg2">
+                <a:shade val="45000"/>
+                <a:satMod val="135000"/>
+              </a:schemeClr>
+              <a:prstClr val="white"/>
+            </a:duotone>
+            <a:extLst>
+              <a:ext uri="{28A0092B-C50C-407E-A947-70E740481C1C}">
+                <a14:useLocalDpi xmlns:a14="http://schemas.microsoft.com/office/drawing/2010/main" val="0"/>
+              </a:ext>
+            </a:extLst>
+          </a:blip>
+          <a:stretch>
+            <a:fillRect/>
+          </a:stretch>
+        </p:blipFill>
+        <p:spPr>
+          <a:xfrm rot="18421615" flipH="1">
+            <a:off x="4265785" y="3699264"/>
+            <a:ext cx="731312" cy="664027"/>
+          </a:xfrm>
+          <a:prstGeom prst="rect">
+            <a:avLst/>
+          </a:prstGeom>
+          <a:ln>
+            <a:noFill/>
+          </a:ln>
+        </p:spPr>
+      </p:pic>
     </p:spTree>
     <p:extLst>
       <p:ext uri="{BB962C8B-B14F-4D97-AF65-F5344CB8AC3E}">

</xml_diff>